<commit_message>
Uploading revised Sara files
</commit_message>
<xml_diff>
--- a/Our Journey.pptx
+++ b/Our Journey.pptx
@@ -6,6 +6,8 @@
   </p:sldMasterIdLst>
   <p:sldIdLst>
     <p:sldId id="256" r:id="rId2"/>
+    <p:sldId id="257" r:id="rId3"/>
+    <p:sldId id="258" r:id="rId4"/>
   </p:sldIdLst>
   <p:sldSz cx="12192000" cy="6858000"/>
   <p:notesSz cx="6858000" cy="9144000"/>
@@ -271,7 +273,7 @@
           <a:p>
             <a:fld id="{5F2083BC-6AFF-45AA-A85F-42DE01D02571}" type="datetimeFigureOut">
               <a:rPr lang="en-US" smtClean="0"/>
-              <a:t>2/26/2022</a:t>
+              <a:t>2/27/2022</a:t>
             </a:fld>
             <a:endParaRPr lang="en-US"/>
           </a:p>
@@ -469,7 +471,7 @@
           <a:p>
             <a:fld id="{5F2083BC-6AFF-45AA-A85F-42DE01D02571}" type="datetimeFigureOut">
               <a:rPr lang="en-US" smtClean="0"/>
-              <a:t>2/26/2022</a:t>
+              <a:t>2/27/2022</a:t>
             </a:fld>
             <a:endParaRPr lang="en-US"/>
           </a:p>
@@ -677,7 +679,7 @@
           <a:p>
             <a:fld id="{5F2083BC-6AFF-45AA-A85F-42DE01D02571}" type="datetimeFigureOut">
               <a:rPr lang="en-US" smtClean="0"/>
-              <a:t>2/26/2022</a:t>
+              <a:t>2/27/2022</a:t>
             </a:fld>
             <a:endParaRPr lang="en-US"/>
           </a:p>
@@ -875,7 +877,7 @@
           <a:p>
             <a:fld id="{5F2083BC-6AFF-45AA-A85F-42DE01D02571}" type="datetimeFigureOut">
               <a:rPr lang="en-US" smtClean="0"/>
-              <a:t>2/26/2022</a:t>
+              <a:t>2/27/2022</a:t>
             </a:fld>
             <a:endParaRPr lang="en-US"/>
           </a:p>
@@ -1150,7 +1152,7 @@
           <a:p>
             <a:fld id="{5F2083BC-6AFF-45AA-A85F-42DE01D02571}" type="datetimeFigureOut">
               <a:rPr lang="en-US" smtClean="0"/>
-              <a:t>2/26/2022</a:t>
+              <a:t>2/27/2022</a:t>
             </a:fld>
             <a:endParaRPr lang="en-US"/>
           </a:p>
@@ -1415,7 +1417,7 @@
           <a:p>
             <a:fld id="{5F2083BC-6AFF-45AA-A85F-42DE01D02571}" type="datetimeFigureOut">
               <a:rPr lang="en-US" smtClean="0"/>
-              <a:t>2/26/2022</a:t>
+              <a:t>2/27/2022</a:t>
             </a:fld>
             <a:endParaRPr lang="en-US"/>
           </a:p>
@@ -1827,7 +1829,7 @@
           <a:p>
             <a:fld id="{5F2083BC-6AFF-45AA-A85F-42DE01D02571}" type="datetimeFigureOut">
               <a:rPr lang="en-US" smtClean="0"/>
-              <a:t>2/26/2022</a:t>
+              <a:t>2/27/2022</a:t>
             </a:fld>
             <a:endParaRPr lang="en-US"/>
           </a:p>
@@ -1968,7 +1970,7 @@
           <a:p>
             <a:fld id="{5F2083BC-6AFF-45AA-A85F-42DE01D02571}" type="datetimeFigureOut">
               <a:rPr lang="en-US" smtClean="0"/>
-              <a:t>2/26/2022</a:t>
+              <a:t>2/27/2022</a:t>
             </a:fld>
             <a:endParaRPr lang="en-US"/>
           </a:p>
@@ -2081,7 +2083,7 @@
           <a:p>
             <a:fld id="{5F2083BC-6AFF-45AA-A85F-42DE01D02571}" type="datetimeFigureOut">
               <a:rPr lang="en-US" smtClean="0"/>
-              <a:t>2/26/2022</a:t>
+              <a:t>2/27/2022</a:t>
             </a:fld>
             <a:endParaRPr lang="en-US"/>
           </a:p>
@@ -2392,7 +2394,7 @@
           <a:p>
             <a:fld id="{5F2083BC-6AFF-45AA-A85F-42DE01D02571}" type="datetimeFigureOut">
               <a:rPr lang="en-US" smtClean="0"/>
-              <a:t>2/26/2022</a:t>
+              <a:t>2/27/2022</a:t>
             </a:fld>
             <a:endParaRPr lang="en-US"/>
           </a:p>
@@ -2680,7 +2682,7 @@
           <a:p>
             <a:fld id="{5F2083BC-6AFF-45AA-A85F-42DE01D02571}" type="datetimeFigureOut">
               <a:rPr lang="en-US" smtClean="0"/>
-              <a:t>2/26/2022</a:t>
+              <a:t>2/27/2022</a:t>
             </a:fld>
             <a:endParaRPr lang="en-US"/>
           </a:p>
@@ -2921,7 +2923,7 @@
           <a:p>
             <a:fld id="{5F2083BC-6AFF-45AA-A85F-42DE01D02571}" type="datetimeFigureOut">
               <a:rPr lang="en-US" smtClean="0"/>
-              <a:t>2/26/2022</a:t>
+              <a:t>2/27/2022</a:t>
             </a:fld>
             <a:endParaRPr lang="en-US"/>
           </a:p>
@@ -3528,7 +3530,7 @@
         </p:blipFill>
         <p:spPr bwMode="auto">
           <a:xfrm>
-            <a:off x="-1504" y="1282"/>
+            <a:off x="-6338" y="1282"/>
             <a:ext cx="12191980" cy="6856718"/>
           </a:xfrm>
           <a:prstGeom prst="rect">
@@ -3574,7 +3576,7 @@
         </p:blipFill>
         <p:spPr>
           <a:xfrm>
-            <a:off x="1883946" y="3326128"/>
+            <a:off x="10346274" y="4448204"/>
             <a:ext cx="1255356" cy="1386966"/>
           </a:xfrm>
           <a:prstGeom prst="rect">
@@ -3610,7 +3612,7 @@
         </p:blipFill>
         <p:spPr>
           <a:xfrm>
-            <a:off x="4846215" y="3600088"/>
+            <a:off x="1901014" y="3954157"/>
             <a:ext cx="694544" cy="839046"/>
           </a:xfrm>
           <a:prstGeom prst="rect">
@@ -3621,6 +3623,7 @@
       <p:pic>
         <p:nvPicPr>
           <p:cNvPr id="19" name="Picture 18" descr="A picture containing clipart&#10;&#10;Description automatically generated">
+            <a:hlinkClick r:id="rId5" action="ppaction://hlinksldjump"/>
             <a:extLst>
               <a:ext uri="{FF2B5EF4-FFF2-40B4-BE49-F238E27FC236}">
                 <a16:creationId xmlns:a16="http://schemas.microsoft.com/office/drawing/2014/main" id="{A23C59E2-1A25-4075-BCAA-656221BD53ED}"/>
@@ -3633,7 +3636,7 @@
           <p:nvPr/>
         </p:nvPicPr>
         <p:blipFill>
-          <a:blip r:embed="rId5">
+          <a:blip r:embed="rId6">
             <a:extLst>
               <a:ext uri="{28A0092B-C50C-407E-A947-70E740481C1C}">
                 <a14:useLocalDpi xmlns:a14="http://schemas.microsoft.com/office/drawing/2010/main" val="0"/>
@@ -3646,7 +3649,7 @@
         </p:blipFill>
         <p:spPr>
           <a:xfrm>
-            <a:off x="7305523" y="3195507"/>
+            <a:off x="7420661" y="3204577"/>
             <a:ext cx="899801" cy="1243627"/>
           </a:xfrm>
           <a:prstGeom prst="rect">
@@ -3669,7 +3672,7 @@
           <p:nvPr/>
         </p:nvPicPr>
         <p:blipFill>
-          <a:blip r:embed="rId6">
+          <a:blip r:embed="rId7">
             <a:extLst>
               <a:ext uri="{28A0092B-C50C-407E-A947-70E740481C1C}">
                 <a14:useLocalDpi xmlns:a14="http://schemas.microsoft.com/office/drawing/2010/main" val="0"/>
@@ -3692,10 +3695,10 @@
       </p:pic>
       <p:sp>
         <p:nvSpPr>
-          <p:cNvPr id="22" name="TextBox 21">
-            <a:extLst>
-              <a:ext uri="{FF2B5EF4-FFF2-40B4-BE49-F238E27FC236}">
-                <a16:creationId xmlns:a16="http://schemas.microsoft.com/office/drawing/2014/main" id="{35EB2C36-FAE8-4449-AD1C-97BB411F960D}"/>
+          <p:cNvPr id="27" name="TextBox 26">
+            <a:extLst>
+              <a:ext uri="{FF2B5EF4-FFF2-40B4-BE49-F238E27FC236}">
+                <a16:creationId xmlns:a16="http://schemas.microsoft.com/office/drawing/2014/main" id="{F08F3B12-154E-4670-B75D-759B5FD6D622}"/>
               </a:ext>
             </a:extLst>
           </p:cNvPr>
@@ -3704,8 +3707,8 @@
         </p:nvSpPr>
         <p:spPr>
           <a:xfrm>
-            <a:off x="8201727" y="5482196"/>
-            <a:ext cx="1233182" cy="646331"/>
+            <a:off x="10061942" y="3715922"/>
+            <a:ext cx="733337" cy="400110"/>
           </a:xfrm>
           <a:prstGeom prst="rect">
             <a:avLst/>
@@ -3719,22 +3722,22 @@
           <a:lstStyle/>
           <a:p>
             <a:r>
-              <a:rPr lang="en-US" i="1" dirty="0">
+              <a:rPr lang="en-US" sz="2000" b="1" i="1" dirty="0">
                 <a:solidFill>
                   <a:schemeClr val="bg1"/>
                 </a:solidFill>
               </a:rPr>
-              <a:t>Key data stats</a:t>
-            </a:r>
-          </a:p>
-        </p:txBody>
-      </p:sp>
-      <p:sp>
-        <p:nvSpPr>
-          <p:cNvPr id="26" name="TextBox 25">
-            <a:extLst>
-              <a:ext uri="{FF2B5EF4-FFF2-40B4-BE49-F238E27FC236}">
-                <a16:creationId xmlns:a16="http://schemas.microsoft.com/office/drawing/2014/main" id="{2C2BB67D-31E1-4773-BCA1-DA0B484EC553}"/>
+              <a:t>YES!</a:t>
+            </a:r>
+          </a:p>
+        </p:txBody>
+      </p:sp>
+      <p:sp>
+        <p:nvSpPr>
+          <p:cNvPr id="35" name="TextBox 34">
+            <a:extLst>
+              <a:ext uri="{FF2B5EF4-FFF2-40B4-BE49-F238E27FC236}">
+                <a16:creationId xmlns:a16="http://schemas.microsoft.com/office/drawing/2014/main" id="{F8C554DB-0690-418D-A570-F628AB593178}"/>
               </a:ext>
             </a:extLst>
           </p:cNvPr>
@@ -3743,8 +3746,8 @@
         </p:nvSpPr>
         <p:spPr>
           <a:xfrm>
-            <a:off x="8736906" y="3494154"/>
-            <a:ext cx="1233182" cy="646331"/>
+            <a:off x="0" y="5671629"/>
+            <a:ext cx="2884415" cy="646331"/>
           </a:xfrm>
           <a:prstGeom prst="rect">
             <a:avLst/>
@@ -3758,61 +3761,22 @@
           <a:lstStyle/>
           <a:p>
             <a:r>
-              <a:rPr lang="en-US" i="1" dirty="0">
+              <a:rPr lang="en-US" b="1" i="1" dirty="0">
                 <a:solidFill>
                   <a:schemeClr val="bg1"/>
                 </a:solidFill>
               </a:rPr>
-              <a:t>Ranked features</a:t>
-            </a:r>
-          </a:p>
-        </p:txBody>
-      </p:sp>
-      <p:sp>
-        <p:nvSpPr>
-          <p:cNvPr id="27" name="TextBox 26">
-            <a:extLst>
-              <a:ext uri="{FF2B5EF4-FFF2-40B4-BE49-F238E27FC236}">
-                <a16:creationId xmlns:a16="http://schemas.microsoft.com/office/drawing/2014/main" id="{F08F3B12-154E-4670-B75D-759B5FD6D622}"/>
-              </a:ext>
-            </a:extLst>
-          </p:cNvPr>
-          <p:cNvSpPr txBox="1"/>
-          <p:nvPr/>
-        </p:nvSpPr>
-        <p:spPr>
-          <a:xfrm>
-            <a:off x="11085551" y="3309488"/>
-            <a:ext cx="733337" cy="369332"/>
-          </a:xfrm>
-          <a:prstGeom prst="rect">
-            <a:avLst/>
-          </a:prstGeom>
-          <a:noFill/>
-        </p:spPr>
-        <p:txBody>
-          <a:bodyPr wrap="square" rtlCol="0">
-            <a:spAutoFit/>
-          </a:bodyPr>
-          <a:lstStyle/>
-          <a:p>
-            <a:r>
-              <a:rPr lang="en-US" i="1" dirty="0">
-                <a:solidFill>
-                  <a:schemeClr val="bg1"/>
-                </a:solidFill>
-              </a:rPr>
-              <a:t>YES!</a:t>
+              <a:t>Can a trail’s popularity be predicted by its features?</a:t>
             </a:r>
           </a:p>
         </p:txBody>
       </p:sp>
       <p:pic>
         <p:nvPicPr>
-          <p:cNvPr id="31" name="Picture 30" descr="A group of people jumping in the air&#10;&#10;Description automatically generated with medium confidence">
-            <a:extLst>
-              <a:ext uri="{FF2B5EF4-FFF2-40B4-BE49-F238E27FC236}">
-                <a16:creationId xmlns:a16="http://schemas.microsoft.com/office/drawing/2014/main" id="{33250909-FA52-49D7-BA89-38D4ED94E7A0}"/>
+          <p:cNvPr id="48" name="Picture 47" descr="A person wearing a mask&#10;&#10;Description automatically generated with medium confidence">
+            <a:extLst>
+              <a:ext uri="{FF2B5EF4-FFF2-40B4-BE49-F238E27FC236}">
+                <a16:creationId xmlns:a16="http://schemas.microsoft.com/office/drawing/2014/main" id="{EC3018D2-51EE-4D68-A21A-C4FD53831C9B}"/>
               </a:ext>
             </a:extLst>
           </p:cNvPr>
@@ -3822,7 +3786,7 @@
           <p:nvPr/>
         </p:nvPicPr>
         <p:blipFill>
-          <a:blip r:embed="rId7">
+          <a:blip r:embed="rId8">
             <a:extLst>
               <a:ext uri="{28A0092B-C50C-407E-A947-70E740481C1C}">
                 <a14:useLocalDpi xmlns:a14="http://schemas.microsoft.com/office/drawing/2010/main" val="0"/>
@@ -3835,8 +3799,8 @@
         </p:blipFill>
         <p:spPr>
           <a:xfrm>
-            <a:off x="10592714" y="857519"/>
-            <a:ext cx="1590897" cy="771633"/>
+            <a:off x="9710825" y="2530573"/>
+            <a:ext cx="1084454" cy="865316"/>
           </a:xfrm>
           <a:prstGeom prst="rect">
             <a:avLst/>
@@ -3845,10 +3809,10 @@
       </p:pic>
       <p:sp>
         <p:nvSpPr>
-          <p:cNvPr id="35" name="TextBox 34">
-            <a:extLst>
-              <a:ext uri="{FF2B5EF4-FFF2-40B4-BE49-F238E27FC236}">
-                <a16:creationId xmlns:a16="http://schemas.microsoft.com/office/drawing/2014/main" id="{F8C554DB-0690-418D-A570-F628AB593178}"/>
+          <p:cNvPr id="49" name="TextBox 48">
+            <a:extLst>
+              <a:ext uri="{FF2B5EF4-FFF2-40B4-BE49-F238E27FC236}">
+                <a16:creationId xmlns:a16="http://schemas.microsoft.com/office/drawing/2014/main" id="{662B4938-555D-48C3-B051-6E800F67822B}"/>
               </a:ext>
             </a:extLst>
           </p:cNvPr>
@@ -3857,8 +3821,8 @@
         </p:nvSpPr>
         <p:spPr>
           <a:xfrm>
-            <a:off x="0" y="5708700"/>
-            <a:ext cx="2884415" cy="646331"/>
+            <a:off x="10241519" y="2620760"/>
+            <a:ext cx="620785" cy="738664"/>
           </a:xfrm>
           <a:prstGeom prst="rect">
             <a:avLst/>
@@ -3872,22 +3836,74 @@
           <a:lstStyle/>
           <a:p>
             <a:r>
-              <a:rPr lang="en-US" i="1" dirty="0">
+              <a:rPr lang="en-US" sz="600" b="1" dirty="0">
                 <a:solidFill>
-                  <a:schemeClr val="bg1"/>
+                  <a:srgbClr val="C00000"/>
                 </a:solidFill>
               </a:rPr>
-              <a:t>Can a trail’s popularity be predicted by its features?</a:t>
+              <a:t>HTML</a:t>
+            </a:r>
+          </a:p>
+          <a:p>
+            <a:endParaRPr lang="en-US" sz="600" b="1" dirty="0">
+              <a:solidFill>
+                <a:srgbClr val="C00000"/>
+              </a:solidFill>
+            </a:endParaRPr>
+          </a:p>
+          <a:p>
+            <a:r>
+              <a:rPr lang="en-US" sz="600" b="1" dirty="0">
+                <a:solidFill>
+                  <a:srgbClr val="C00000"/>
+                </a:solidFill>
+              </a:rPr>
+              <a:t>CSS</a:t>
+            </a:r>
+          </a:p>
+          <a:p>
+            <a:endParaRPr lang="en-US" sz="600" b="1" dirty="0">
+              <a:solidFill>
+                <a:srgbClr val="C00000"/>
+              </a:solidFill>
+            </a:endParaRPr>
+          </a:p>
+          <a:p>
+            <a:r>
+              <a:rPr lang="en-US" sz="600" b="1" dirty="0">
+                <a:solidFill>
+                  <a:srgbClr val="C00000"/>
+                </a:solidFill>
+              </a:rPr>
+              <a:t>JAVASCRIPT</a:t>
+            </a:r>
+          </a:p>
+          <a:p>
+            <a:endParaRPr lang="en-US" sz="600" b="1" dirty="0">
+              <a:solidFill>
+                <a:srgbClr val="C00000"/>
+              </a:solidFill>
+            </a:endParaRPr>
+          </a:p>
+          <a:p>
+            <a:r>
+              <a:rPr lang="en-US" sz="600" b="1" dirty="0">
+                <a:solidFill>
+                  <a:srgbClr val="C00000"/>
+                </a:solidFill>
+              </a:rPr>
+              <a:t>LEAFLET</a:t>
             </a:r>
           </a:p>
         </p:txBody>
       </p:sp>
       <p:pic>
         <p:nvPicPr>
-          <p:cNvPr id="48" name="Picture 47" descr="A person wearing a mask&#10;&#10;Description automatically generated with medium confidence">
-            <a:extLst>
-              <a:ext uri="{FF2B5EF4-FFF2-40B4-BE49-F238E27FC236}">
-                <a16:creationId xmlns:a16="http://schemas.microsoft.com/office/drawing/2014/main" id="{EC3018D2-51EE-4D68-A21A-C4FD53831C9B}"/>
+          <p:cNvPr id="9" name="Picture 8" descr="A picture containing doll, toy, several&#10;&#10;Description automatically generated">
+            <a:hlinkClick r:id="" action="ppaction://hlinkshowjump?jump=nextslide"/>
+            <a:extLst>
+              <a:ext uri="{FF2B5EF4-FFF2-40B4-BE49-F238E27FC236}">
+                <a16:creationId xmlns:a16="http://schemas.microsoft.com/office/drawing/2014/main" id="{43C2D5D0-F163-42F9-96E4-FE0BAA390C85}"/>
               </a:ext>
             </a:extLst>
           </p:cNvPr>
@@ -3897,7 +3913,7 @@
           <p:nvPr/>
         </p:nvPicPr>
         <p:blipFill>
-          <a:blip r:embed="rId8">
+          <a:blip r:embed="rId9">
             <a:extLst>
               <a:ext uri="{28A0092B-C50C-407E-A947-70E740481C1C}">
                 <a14:useLocalDpi xmlns:a14="http://schemas.microsoft.com/office/drawing/2010/main" val="0"/>
@@ -3910,110 +3926,20 @@
         </p:blipFill>
         <p:spPr>
           <a:xfrm>
-            <a:off x="9502226" y="2169964"/>
-            <a:ext cx="1084454" cy="865316"/>
+            <a:off x="6403503" y="5329201"/>
+            <a:ext cx="1703741" cy="1182902"/>
           </a:xfrm>
           <a:prstGeom prst="rect">
             <a:avLst/>
           </a:prstGeom>
         </p:spPr>
       </p:pic>
-      <p:sp>
-        <p:nvSpPr>
-          <p:cNvPr id="49" name="TextBox 48">
-            <a:extLst>
-              <a:ext uri="{FF2B5EF4-FFF2-40B4-BE49-F238E27FC236}">
-                <a16:creationId xmlns:a16="http://schemas.microsoft.com/office/drawing/2014/main" id="{662B4938-555D-48C3-B051-6E800F67822B}"/>
-              </a:ext>
-            </a:extLst>
-          </p:cNvPr>
-          <p:cNvSpPr txBox="1"/>
-          <p:nvPr/>
-        </p:nvSpPr>
-        <p:spPr>
-          <a:xfrm>
-            <a:off x="10080258" y="2234359"/>
-            <a:ext cx="620785" cy="738664"/>
-          </a:xfrm>
-          <a:prstGeom prst="rect">
-            <a:avLst/>
-          </a:prstGeom>
-          <a:noFill/>
-        </p:spPr>
-        <p:txBody>
-          <a:bodyPr wrap="square" rtlCol="0">
-            <a:spAutoFit/>
-          </a:bodyPr>
-          <a:lstStyle/>
-          <a:p>
-            <a:r>
-              <a:rPr lang="en-US" sz="600" b="1" dirty="0">
-                <a:solidFill>
-                  <a:srgbClr val="C00000"/>
-                </a:solidFill>
-              </a:rPr>
-              <a:t>HTML</a:t>
-            </a:r>
-          </a:p>
-          <a:p>
-            <a:endParaRPr lang="en-US" sz="600" b="1" dirty="0">
-              <a:solidFill>
-                <a:srgbClr val="C00000"/>
-              </a:solidFill>
-            </a:endParaRPr>
-          </a:p>
-          <a:p>
-            <a:r>
-              <a:rPr lang="en-US" sz="600" b="1" dirty="0">
-                <a:solidFill>
-                  <a:srgbClr val="C00000"/>
-                </a:solidFill>
-              </a:rPr>
-              <a:t>CSS</a:t>
-            </a:r>
-          </a:p>
-          <a:p>
-            <a:endParaRPr lang="en-US" sz="600" b="1" dirty="0">
-              <a:solidFill>
-                <a:srgbClr val="C00000"/>
-              </a:solidFill>
-            </a:endParaRPr>
-          </a:p>
-          <a:p>
-            <a:r>
-              <a:rPr lang="en-US" sz="600" b="1" dirty="0">
-                <a:solidFill>
-                  <a:srgbClr val="C00000"/>
-                </a:solidFill>
-              </a:rPr>
-              <a:t>JAVASCRIPT</a:t>
-            </a:r>
-          </a:p>
-          <a:p>
-            <a:endParaRPr lang="en-US" sz="600" b="1" dirty="0">
-              <a:solidFill>
-                <a:srgbClr val="C00000"/>
-              </a:solidFill>
-            </a:endParaRPr>
-          </a:p>
-          <a:p>
-            <a:r>
-              <a:rPr lang="en-US" sz="600" b="1" dirty="0">
-                <a:solidFill>
-                  <a:srgbClr val="C00000"/>
-                </a:solidFill>
-              </a:rPr>
-              <a:t>LEAFLET</a:t>
-            </a:r>
-          </a:p>
-        </p:txBody>
-      </p:sp>
       <p:pic>
         <p:nvPicPr>
-          <p:cNvPr id="9" name="Picture 8" descr="A picture containing doll, toy, several&#10;&#10;Description automatically generated">
-            <a:extLst>
-              <a:ext uri="{FF2B5EF4-FFF2-40B4-BE49-F238E27FC236}">
-                <a16:creationId xmlns:a16="http://schemas.microsoft.com/office/drawing/2014/main" id="{43C2D5D0-F163-42F9-96E4-FE0BAA390C85}"/>
+          <p:cNvPr id="16" name="Picture 15">
+            <a:extLst>
+              <a:ext uri="{FF2B5EF4-FFF2-40B4-BE49-F238E27FC236}">
+                <a16:creationId xmlns:a16="http://schemas.microsoft.com/office/drawing/2014/main" id="{3118BE87-ABC8-4218-9E76-E13E827B61F0}"/>
               </a:ext>
             </a:extLst>
           </p:cNvPr>
@@ -4023,7 +3949,7 @@
           <p:nvPr/>
         </p:nvPicPr>
         <p:blipFill>
-          <a:blip r:embed="rId9">
+          <a:blip r:embed="rId10">
             <a:extLst>
               <a:ext uri="{28A0092B-C50C-407E-A947-70E740481C1C}">
                 <a14:useLocalDpi xmlns:a14="http://schemas.microsoft.com/office/drawing/2010/main" val="0"/>
@@ -4036,8 +3962,8 @@
         </p:blipFill>
         <p:spPr>
           <a:xfrm>
-            <a:off x="6335025" y="5335422"/>
-            <a:ext cx="1703741" cy="1182902"/>
+            <a:off x="10406692" y="758484"/>
+            <a:ext cx="1780105" cy="1102400"/>
           </a:xfrm>
           <a:prstGeom prst="rect">
             <a:avLst/>
@@ -4146,33 +4072,6 @@
                                   </p:childTnLst>
                                 </p:cTn>
                               </p:par>
-                              <p:par>
-                                <p:cTn id="11" presetID="1" presetClass="entr" presetSubtype="0" fill="hold" grpId="0" nodeType="withEffect">
-                                  <p:stCondLst>
-                                    <p:cond delay="0"/>
-                                  </p:stCondLst>
-                                  <p:childTnLst>
-                                    <p:set>
-                                      <p:cBhvr>
-                                        <p:cTn id="12" dur="1" fill="hold">
-                                          <p:stCondLst>
-                                            <p:cond delay="0"/>
-                                          </p:stCondLst>
-                                        </p:cTn>
-                                        <p:tgtEl>
-                                          <p:spTgt spid="22"/>
-                                        </p:tgtEl>
-                                        <p:attrNameLst>
-                                          <p:attrName>style.visibility</p:attrName>
-                                        </p:attrNameLst>
-                                      </p:cBhvr>
-                                      <p:to>
-                                        <p:strVal val="visible"/>
-                                      </p:to>
-                                    </p:set>
-                                  </p:childTnLst>
-                                </p:cTn>
-                              </p:par>
                             </p:childTnLst>
                           </p:cTn>
                         </p:par>
@@ -4180,26 +4079,26 @@
                     </p:cTn>
                   </p:par>
                   <p:par>
-                    <p:cTn id="13" fill="hold">
+                    <p:cTn id="11" fill="hold">
                       <p:stCondLst>
                         <p:cond delay="indefinite"/>
                       </p:stCondLst>
                       <p:childTnLst>
                         <p:par>
-                          <p:cTn id="14" fill="hold">
+                          <p:cTn id="12" fill="hold">
                             <p:stCondLst>
                               <p:cond delay="0"/>
                             </p:stCondLst>
                             <p:childTnLst>
                               <p:par>
-                                <p:cTn id="15" presetID="1" presetClass="entr" presetSubtype="0" fill="hold" nodeType="clickEffect">
+                                <p:cTn id="13" presetID="1" presetClass="entr" presetSubtype="0" fill="hold" nodeType="clickEffect">
                                   <p:stCondLst>
                                     <p:cond delay="0"/>
                                   </p:stCondLst>
                                   <p:childTnLst>
                                     <p:set>
                                       <p:cBhvr>
-                                        <p:cTn id="16" dur="1" fill="hold">
+                                        <p:cTn id="14" dur="1" fill="hold">
                                           <p:stCondLst>
                                             <p:cond delay="0"/>
                                           </p:stCondLst>
@@ -4225,26 +4124,26 @@
                     </p:cTn>
                   </p:par>
                   <p:par>
-                    <p:cTn id="17" fill="hold">
+                    <p:cTn id="15" fill="hold">
                       <p:stCondLst>
                         <p:cond delay="indefinite"/>
                       </p:stCondLst>
                       <p:childTnLst>
                         <p:par>
-                          <p:cTn id="18" fill="hold">
+                          <p:cTn id="16" fill="hold">
                             <p:stCondLst>
                               <p:cond delay="0"/>
                             </p:stCondLst>
                             <p:childTnLst>
                               <p:par>
-                                <p:cTn id="19" presetID="1" presetClass="entr" presetSubtype="0" fill="hold" nodeType="clickEffect">
+                                <p:cTn id="17" presetID="1" presetClass="entr" presetSubtype="0" fill="hold" nodeType="clickEffect">
                                   <p:stCondLst>
                                     <p:cond delay="0"/>
                                   </p:stCondLst>
                                   <p:childTnLst>
                                     <p:set>
                                       <p:cBhvr>
-                                        <p:cTn id="20" dur="1" fill="hold">
+                                        <p:cTn id="18" dur="1" fill="hold">
                                           <p:stCondLst>
                                             <p:cond delay="0"/>
                                           </p:stCondLst>
@@ -4270,26 +4169,26 @@
                     </p:cTn>
                   </p:par>
                   <p:par>
-                    <p:cTn id="21" fill="hold">
+                    <p:cTn id="19" fill="hold">
                       <p:stCondLst>
                         <p:cond delay="indefinite"/>
                       </p:stCondLst>
                       <p:childTnLst>
                         <p:par>
-                          <p:cTn id="22" fill="hold">
+                          <p:cTn id="20" fill="hold">
                             <p:stCondLst>
                               <p:cond delay="0"/>
                             </p:stCondLst>
                             <p:childTnLst>
                               <p:par>
-                                <p:cTn id="23" presetID="1" presetClass="entr" presetSubtype="0" fill="hold" nodeType="clickEffect">
+                                <p:cTn id="21" presetID="1" presetClass="entr" presetSubtype="0" fill="hold" nodeType="clickEffect">
                                   <p:stCondLst>
                                     <p:cond delay="0"/>
                                   </p:stCondLst>
                                   <p:childTnLst>
                                     <p:set>
                                       <p:cBhvr>
-                                        <p:cTn id="24" dur="1" fill="hold">
+                                        <p:cTn id="22" dur="1" fill="hold">
                                           <p:stCondLst>
                                             <p:cond delay="0"/>
                                           </p:stCondLst>
@@ -4308,8 +4207,26 @@
                                   </p:childTnLst>
                                 </p:cTn>
                               </p:par>
+                            </p:childTnLst>
+                          </p:cTn>
+                        </p:par>
+                      </p:childTnLst>
+                    </p:cTn>
+                  </p:par>
+                  <p:par>
+                    <p:cTn id="23" fill="hold">
+                      <p:stCondLst>
+                        <p:cond delay="indefinite"/>
+                      </p:stCondLst>
+                      <p:childTnLst>
+                        <p:par>
+                          <p:cTn id="24" fill="hold">
+                            <p:stCondLst>
+                              <p:cond delay="0"/>
+                            </p:stCondLst>
+                            <p:childTnLst>
                               <p:par>
-                                <p:cTn id="25" presetID="1" presetClass="entr" presetSubtype="0" fill="hold" grpId="0" nodeType="withEffect">
+                                <p:cTn id="25" presetID="1" presetClass="entr" presetSubtype="0" fill="hold" grpId="0" nodeType="clickEffect">
                                   <p:stCondLst>
                                     <p:cond delay="0"/>
                                   </p:stCondLst>
@@ -4322,7 +4239,7 @@
                                           </p:stCondLst>
                                         </p:cTn>
                                         <p:tgtEl>
-                                          <p:spTgt spid="26"/>
+                                          <p:spTgt spid="27"/>
                                         </p:tgtEl>
                                         <p:attrNameLst>
                                           <p:attrName>style.visibility</p:attrName>
@@ -4354,7 +4271,7 @@
                             </p:stCondLst>
                             <p:childTnLst>
                               <p:par>
-                                <p:cTn id="29" presetID="1" presetClass="entr" presetSubtype="0" fill="hold" grpId="0" nodeType="clickEffect">
+                                <p:cTn id="29" presetID="1" presetClass="entr" presetSubtype="0" fill="hold" nodeType="clickEffect">
                                   <p:stCondLst>
                                     <p:cond delay="0"/>
                                   </p:stCondLst>
@@ -4362,51 +4279,6 @@
                                     <p:set>
                                       <p:cBhvr>
                                         <p:cTn id="30" dur="1" fill="hold">
-                                          <p:stCondLst>
-                                            <p:cond delay="0"/>
-                                          </p:stCondLst>
-                                        </p:cTn>
-                                        <p:tgtEl>
-                                          <p:spTgt spid="27"/>
-                                        </p:tgtEl>
-                                        <p:attrNameLst>
-                                          <p:attrName>style.visibility</p:attrName>
-                                        </p:attrNameLst>
-                                      </p:cBhvr>
-                                      <p:to>
-                                        <p:strVal val="visible"/>
-                                      </p:to>
-                                    </p:set>
-                                  </p:childTnLst>
-                                </p:cTn>
-                              </p:par>
-                            </p:childTnLst>
-                          </p:cTn>
-                        </p:par>
-                      </p:childTnLst>
-                    </p:cTn>
-                  </p:par>
-                  <p:par>
-                    <p:cTn id="31" fill="hold">
-                      <p:stCondLst>
-                        <p:cond delay="indefinite"/>
-                      </p:stCondLst>
-                      <p:childTnLst>
-                        <p:par>
-                          <p:cTn id="32" fill="hold">
-                            <p:stCondLst>
-                              <p:cond delay="0"/>
-                            </p:stCondLst>
-                            <p:childTnLst>
-                              <p:par>
-                                <p:cTn id="33" presetID="1" presetClass="entr" presetSubtype="0" fill="hold" nodeType="clickEffect">
-                                  <p:stCondLst>
-                                    <p:cond delay="0"/>
-                                  </p:stCondLst>
-                                  <p:childTnLst>
-                                    <p:set>
-                                      <p:cBhvr>
-                                        <p:cTn id="34" dur="1" fill="hold">
                                           <p:stCondLst>
                                             <p:cond delay="0"/>
                                           </p:stCondLst>
@@ -4426,65 +4298,20 @@
                                 </p:cTn>
                               </p:par>
                               <p:par>
-                                <p:cTn id="35" presetID="1" presetClass="entr" presetSubtype="0" fill="hold" grpId="0" nodeType="withEffect">
+                                <p:cTn id="31" presetID="1" presetClass="entr" presetSubtype="0" fill="hold" grpId="0" nodeType="withEffect">
                                   <p:stCondLst>
                                     <p:cond delay="0"/>
                                   </p:stCondLst>
                                   <p:childTnLst>
                                     <p:set>
                                       <p:cBhvr>
-                                        <p:cTn id="36" dur="1" fill="hold">
+                                        <p:cTn id="32" dur="1" fill="hold">
                                           <p:stCondLst>
                                             <p:cond delay="0"/>
                                           </p:stCondLst>
                                         </p:cTn>
                                         <p:tgtEl>
                                           <p:spTgt spid="49"/>
-                                        </p:tgtEl>
-                                        <p:attrNameLst>
-                                          <p:attrName>style.visibility</p:attrName>
-                                        </p:attrNameLst>
-                                      </p:cBhvr>
-                                      <p:to>
-                                        <p:strVal val="visible"/>
-                                      </p:to>
-                                    </p:set>
-                                  </p:childTnLst>
-                                </p:cTn>
-                              </p:par>
-                            </p:childTnLst>
-                          </p:cTn>
-                        </p:par>
-                      </p:childTnLst>
-                    </p:cTn>
-                  </p:par>
-                  <p:par>
-                    <p:cTn id="37" fill="hold">
-                      <p:stCondLst>
-                        <p:cond delay="indefinite"/>
-                      </p:stCondLst>
-                      <p:childTnLst>
-                        <p:par>
-                          <p:cTn id="38" fill="hold">
-                            <p:stCondLst>
-                              <p:cond delay="0"/>
-                            </p:stCondLst>
-                            <p:childTnLst>
-                              <p:par>
-                                <p:cTn id="39" presetID="1" presetClass="entr" presetSubtype="0" fill="hold" nodeType="clickEffect">
-                                  <p:stCondLst>
-                                    <p:cond delay="0"/>
-                                  </p:stCondLst>
-                                  <p:childTnLst>
-                                    <p:set>
-                                      <p:cBhvr>
-                                        <p:cTn id="40" dur="1" fill="hold">
-                                          <p:stCondLst>
-                                            <p:cond delay="0"/>
-                                          </p:stCondLst>
-                                        </p:cTn>
-                                        <p:tgtEl>
-                                          <p:spTgt spid="31"/>
                                         </p:tgtEl>
                                         <p:attrNameLst>
                                           <p:attrName>style.visibility</p:attrName>
@@ -4525,12 +4352,252 @@
       </p:par>
     </p:tnLst>
     <p:bldLst>
-      <p:bldP spid="22" grpId="0"/>
-      <p:bldP spid="26" grpId="0"/>
       <p:bldP spid="27" grpId="0"/>
       <p:bldP spid="49" grpId="0"/>
     </p:bldLst>
   </p:timing>
+</p:sld>
+</file>
+
+<file path=ppt/slides/slide2.xml><?xml version="1.0" encoding="utf-8"?>
+<p:sld xmlns:a="http://schemas.openxmlformats.org/drawingml/2006/main" xmlns:r="http://schemas.openxmlformats.org/officeDocument/2006/relationships" xmlns:p="http://schemas.openxmlformats.org/presentationml/2006/main">
+  <p:cSld>
+    <p:spTree>
+      <p:nvGrpSpPr>
+        <p:cNvPr id="1" name=""/>
+        <p:cNvGrpSpPr/>
+        <p:nvPr/>
+      </p:nvGrpSpPr>
+      <p:grpSpPr>
+        <a:xfrm>
+          <a:off x="0" y="0"/>
+          <a:ext cx="0" cy="0"/>
+          <a:chOff x="0" y="0"/>
+          <a:chExt cx="0" cy="0"/>
+        </a:xfrm>
+      </p:grpSpPr>
+      <p:pic>
+        <p:nvPicPr>
+          <p:cNvPr id="2" name="Picture 1" descr="Chart, histogram&#10;&#10;Description automatically generated">
+            <a:hlinkClick r:id="" action="ppaction://hlinkshowjump?jump=previousslide"/>
+            <a:extLst>
+              <a:ext uri="{FF2B5EF4-FFF2-40B4-BE49-F238E27FC236}">
+                <a16:creationId xmlns:a16="http://schemas.microsoft.com/office/drawing/2014/main" id="{D85F27E5-02E5-4A67-B62F-6E8679DFE8D7}"/>
+              </a:ext>
+            </a:extLst>
+          </p:cNvPr>
+          <p:cNvPicPr>
+            <a:picLocks noChangeAspect="1"/>
+          </p:cNvPicPr>
+          <p:nvPr/>
+        </p:nvPicPr>
+        <p:blipFill>
+          <a:blip r:embed="rId2">
+            <a:extLst>
+              <a:ext uri="{28A0092B-C50C-407E-A947-70E740481C1C}">
+                <a14:useLocalDpi xmlns:a14="http://schemas.microsoft.com/office/drawing/2010/main" val="0"/>
+              </a:ext>
+            </a:extLst>
+          </a:blip>
+          <a:stretch>
+            <a:fillRect/>
+          </a:stretch>
+        </p:blipFill>
+        <p:spPr>
+          <a:xfrm>
+            <a:off x="218774" y="191774"/>
+            <a:ext cx="3538407" cy="3021660"/>
+          </a:xfrm>
+          <a:prstGeom prst="rect">
+            <a:avLst/>
+          </a:prstGeom>
+        </p:spPr>
+      </p:pic>
+      <p:pic>
+        <p:nvPicPr>
+          <p:cNvPr id="4" name="Picture 3" descr="Text, table&#10;&#10;Description automatically generated with medium confidence">
+            <a:extLst>
+              <a:ext uri="{FF2B5EF4-FFF2-40B4-BE49-F238E27FC236}">
+                <a16:creationId xmlns:a16="http://schemas.microsoft.com/office/drawing/2014/main" id="{BD5BCDB8-CD24-44D1-9C46-12BC783A8773}"/>
+              </a:ext>
+            </a:extLst>
+          </p:cNvPr>
+          <p:cNvPicPr>
+            <a:picLocks noChangeAspect="1"/>
+          </p:cNvPicPr>
+          <p:nvPr/>
+        </p:nvPicPr>
+        <p:blipFill>
+          <a:blip r:embed="rId3">
+            <a:extLst>
+              <a:ext uri="{28A0092B-C50C-407E-A947-70E740481C1C}">
+                <a14:useLocalDpi xmlns:a14="http://schemas.microsoft.com/office/drawing/2010/main" val="0"/>
+              </a:ext>
+            </a:extLst>
+          </a:blip>
+          <a:stretch>
+            <a:fillRect/>
+          </a:stretch>
+        </p:blipFill>
+        <p:spPr>
+          <a:xfrm>
+            <a:off x="5110814" y="509613"/>
+            <a:ext cx="1448002" cy="1705213"/>
+          </a:xfrm>
+          <a:prstGeom prst="rect">
+            <a:avLst/>
+          </a:prstGeom>
+        </p:spPr>
+      </p:pic>
+      <p:pic>
+        <p:nvPicPr>
+          <p:cNvPr id="5" name="Picture 4" descr="Text&#10;&#10;Description automatically generated">
+            <a:extLst>
+              <a:ext uri="{FF2B5EF4-FFF2-40B4-BE49-F238E27FC236}">
+                <a16:creationId xmlns:a16="http://schemas.microsoft.com/office/drawing/2014/main" id="{747AFBD1-D164-4549-B370-4C3DDEFB6F81}"/>
+              </a:ext>
+            </a:extLst>
+          </p:cNvPr>
+          <p:cNvPicPr>
+            <a:picLocks noChangeAspect="1"/>
+          </p:cNvPicPr>
+          <p:nvPr/>
+        </p:nvPicPr>
+        <p:blipFill>
+          <a:blip r:embed="rId4">
+            <a:extLst>
+              <a:ext uri="{28A0092B-C50C-407E-A947-70E740481C1C}">
+                <a14:useLocalDpi xmlns:a14="http://schemas.microsoft.com/office/drawing/2010/main" val="0"/>
+              </a:ext>
+            </a:extLst>
+          </a:blip>
+          <a:stretch>
+            <a:fillRect/>
+          </a:stretch>
+        </p:blipFill>
+        <p:spPr>
+          <a:xfrm>
+            <a:off x="7455714" y="547719"/>
+            <a:ext cx="1495634" cy="1629002"/>
+          </a:xfrm>
+          <a:prstGeom prst="rect">
+            <a:avLst/>
+          </a:prstGeom>
+        </p:spPr>
+      </p:pic>
+    </p:spTree>
+    <p:extLst>
+      <p:ext uri="{BB962C8B-B14F-4D97-AF65-F5344CB8AC3E}">
+        <p14:creationId xmlns:p14="http://schemas.microsoft.com/office/powerpoint/2010/main" val="491609063"/>
+      </p:ext>
+    </p:extLst>
+  </p:cSld>
+  <p:clrMapOvr>
+    <a:masterClrMapping/>
+  </p:clrMapOvr>
+</p:sld>
+</file>
+
+<file path=ppt/slides/slide3.xml><?xml version="1.0" encoding="utf-8"?>
+<p:sld xmlns:a="http://schemas.openxmlformats.org/drawingml/2006/main" xmlns:r="http://schemas.openxmlformats.org/officeDocument/2006/relationships" xmlns:p="http://schemas.openxmlformats.org/presentationml/2006/main">
+  <p:cSld>
+    <p:spTree>
+      <p:nvGrpSpPr>
+        <p:cNvPr id="1" name=""/>
+        <p:cNvGrpSpPr/>
+        <p:nvPr/>
+      </p:nvGrpSpPr>
+      <p:grpSpPr>
+        <a:xfrm>
+          <a:off x="0" y="0"/>
+          <a:ext cx="0" cy="0"/>
+          <a:chOff x="0" y="0"/>
+          <a:chExt cx="0" cy="0"/>
+        </a:xfrm>
+      </p:grpSpPr>
+      <p:pic>
+        <p:nvPicPr>
+          <p:cNvPr id="3" name="Picture 2" descr="Table&#10;&#10;Description automatically generated">
+            <a:hlinkClick r:id="" action="ppaction://hlinkshowjump?jump=firstslide"/>
+            <a:extLst>
+              <a:ext uri="{FF2B5EF4-FFF2-40B4-BE49-F238E27FC236}">
+                <a16:creationId xmlns:a16="http://schemas.microsoft.com/office/drawing/2014/main" id="{6ACAF9D6-2D94-4D10-B84D-3F07177DED62}"/>
+              </a:ext>
+            </a:extLst>
+          </p:cNvPr>
+          <p:cNvPicPr>
+            <a:picLocks noChangeAspect="1"/>
+          </p:cNvPicPr>
+          <p:nvPr/>
+        </p:nvPicPr>
+        <p:blipFill>
+          <a:blip r:embed="rId2">
+            <a:extLst>
+              <a:ext uri="{28A0092B-C50C-407E-A947-70E740481C1C}">
+                <a14:useLocalDpi xmlns:a14="http://schemas.microsoft.com/office/drawing/2010/main" val="0"/>
+              </a:ext>
+            </a:extLst>
+          </a:blip>
+          <a:stretch>
+            <a:fillRect/>
+          </a:stretch>
+        </p:blipFill>
+        <p:spPr>
+          <a:xfrm>
+            <a:off x="430762" y="356950"/>
+            <a:ext cx="4410691" cy="3400900"/>
+          </a:xfrm>
+          <a:prstGeom prst="rect">
+            <a:avLst/>
+          </a:prstGeom>
+        </p:spPr>
+      </p:pic>
+      <p:pic>
+        <p:nvPicPr>
+          <p:cNvPr id="5" name="Picture 4" descr="Text&#10;&#10;Description automatically generated">
+            <a:extLst>
+              <a:ext uri="{FF2B5EF4-FFF2-40B4-BE49-F238E27FC236}">
+                <a16:creationId xmlns:a16="http://schemas.microsoft.com/office/drawing/2014/main" id="{F8EAA841-3250-49B4-A84E-8FE69CF49BBF}"/>
+              </a:ext>
+            </a:extLst>
+          </p:cNvPr>
+          <p:cNvPicPr>
+            <a:picLocks noChangeAspect="1"/>
+          </p:cNvPicPr>
+          <p:nvPr/>
+        </p:nvPicPr>
+        <p:blipFill>
+          <a:blip r:embed="rId3">
+            <a:extLst>
+              <a:ext uri="{28A0092B-C50C-407E-A947-70E740481C1C}">
+                <a14:useLocalDpi xmlns:a14="http://schemas.microsoft.com/office/drawing/2010/main" val="0"/>
+              </a:ext>
+            </a:extLst>
+          </a:blip>
+          <a:stretch>
+            <a:fillRect/>
+          </a:stretch>
+        </p:blipFill>
+        <p:spPr>
+          <a:xfrm>
+            <a:off x="5932446" y="242252"/>
+            <a:ext cx="5896798" cy="6258798"/>
+          </a:xfrm>
+          <a:prstGeom prst="rect">
+            <a:avLst/>
+          </a:prstGeom>
+        </p:spPr>
+      </p:pic>
+    </p:spTree>
+    <p:extLst>
+      <p:ext uri="{BB962C8B-B14F-4D97-AF65-F5344CB8AC3E}">
+        <p14:creationId xmlns:p14="http://schemas.microsoft.com/office/powerpoint/2010/main" val="3798350288"/>
+      </p:ext>
+    </p:extLst>
+  </p:cSld>
+  <p:clrMapOvr>
+    <a:masterClrMapping/>
+  </p:clrMapOvr>
 </p:sld>
 </file>
 

</xml_diff>

<commit_message>
Uploading final model files Sara
</commit_message>
<xml_diff>
--- a/Our Journey.pptx
+++ b/Our Journey.pptx
@@ -273,7 +273,7 @@
           <a:p>
             <a:fld id="{5F2083BC-6AFF-45AA-A85F-42DE01D02571}" type="datetimeFigureOut">
               <a:rPr lang="en-US" smtClean="0"/>
-              <a:t>2/27/2022</a:t>
+              <a:t>3/1/2022</a:t>
             </a:fld>
             <a:endParaRPr lang="en-US"/>
           </a:p>
@@ -471,7 +471,7 @@
           <a:p>
             <a:fld id="{5F2083BC-6AFF-45AA-A85F-42DE01D02571}" type="datetimeFigureOut">
               <a:rPr lang="en-US" smtClean="0"/>
-              <a:t>2/27/2022</a:t>
+              <a:t>3/1/2022</a:t>
             </a:fld>
             <a:endParaRPr lang="en-US"/>
           </a:p>
@@ -679,7 +679,7 @@
           <a:p>
             <a:fld id="{5F2083BC-6AFF-45AA-A85F-42DE01D02571}" type="datetimeFigureOut">
               <a:rPr lang="en-US" smtClean="0"/>
-              <a:t>2/27/2022</a:t>
+              <a:t>3/1/2022</a:t>
             </a:fld>
             <a:endParaRPr lang="en-US"/>
           </a:p>
@@ -877,7 +877,7 @@
           <a:p>
             <a:fld id="{5F2083BC-6AFF-45AA-A85F-42DE01D02571}" type="datetimeFigureOut">
               <a:rPr lang="en-US" smtClean="0"/>
-              <a:t>2/27/2022</a:t>
+              <a:t>3/1/2022</a:t>
             </a:fld>
             <a:endParaRPr lang="en-US"/>
           </a:p>
@@ -1152,7 +1152,7 @@
           <a:p>
             <a:fld id="{5F2083BC-6AFF-45AA-A85F-42DE01D02571}" type="datetimeFigureOut">
               <a:rPr lang="en-US" smtClean="0"/>
-              <a:t>2/27/2022</a:t>
+              <a:t>3/1/2022</a:t>
             </a:fld>
             <a:endParaRPr lang="en-US"/>
           </a:p>
@@ -1417,7 +1417,7 @@
           <a:p>
             <a:fld id="{5F2083BC-6AFF-45AA-A85F-42DE01D02571}" type="datetimeFigureOut">
               <a:rPr lang="en-US" smtClean="0"/>
-              <a:t>2/27/2022</a:t>
+              <a:t>3/1/2022</a:t>
             </a:fld>
             <a:endParaRPr lang="en-US"/>
           </a:p>
@@ -1829,7 +1829,7 @@
           <a:p>
             <a:fld id="{5F2083BC-6AFF-45AA-A85F-42DE01D02571}" type="datetimeFigureOut">
               <a:rPr lang="en-US" smtClean="0"/>
-              <a:t>2/27/2022</a:t>
+              <a:t>3/1/2022</a:t>
             </a:fld>
             <a:endParaRPr lang="en-US"/>
           </a:p>
@@ -1970,7 +1970,7 @@
           <a:p>
             <a:fld id="{5F2083BC-6AFF-45AA-A85F-42DE01D02571}" type="datetimeFigureOut">
               <a:rPr lang="en-US" smtClean="0"/>
-              <a:t>2/27/2022</a:t>
+              <a:t>3/1/2022</a:t>
             </a:fld>
             <a:endParaRPr lang="en-US"/>
           </a:p>
@@ -2083,7 +2083,7 @@
           <a:p>
             <a:fld id="{5F2083BC-6AFF-45AA-A85F-42DE01D02571}" type="datetimeFigureOut">
               <a:rPr lang="en-US" smtClean="0"/>
-              <a:t>2/27/2022</a:t>
+              <a:t>3/1/2022</a:t>
             </a:fld>
             <a:endParaRPr lang="en-US"/>
           </a:p>
@@ -2394,7 +2394,7 @@
           <a:p>
             <a:fld id="{5F2083BC-6AFF-45AA-A85F-42DE01D02571}" type="datetimeFigureOut">
               <a:rPr lang="en-US" smtClean="0"/>
-              <a:t>2/27/2022</a:t>
+              <a:t>3/1/2022</a:t>
             </a:fld>
             <a:endParaRPr lang="en-US"/>
           </a:p>
@@ -2682,7 +2682,7 @@
           <a:p>
             <a:fld id="{5F2083BC-6AFF-45AA-A85F-42DE01D02571}" type="datetimeFigureOut">
               <a:rPr lang="en-US" smtClean="0"/>
-              <a:t>2/27/2022</a:t>
+              <a:t>3/1/2022</a:t>
             </a:fld>
             <a:endParaRPr lang="en-US"/>
           </a:p>
@@ -2923,7 +2923,7 @@
           <a:p>
             <a:fld id="{5F2083BC-6AFF-45AA-A85F-42DE01D02571}" type="datetimeFigureOut">
               <a:rPr lang="en-US" smtClean="0"/>
-              <a:t>2/27/2022</a:t>
+              <a:t>3/1/2022</a:t>
             </a:fld>
             <a:endParaRPr lang="en-US"/>
           </a:p>
@@ -3695,45 +3695,6 @@
       </p:pic>
       <p:sp>
         <p:nvSpPr>
-          <p:cNvPr id="27" name="TextBox 26">
-            <a:extLst>
-              <a:ext uri="{FF2B5EF4-FFF2-40B4-BE49-F238E27FC236}">
-                <a16:creationId xmlns:a16="http://schemas.microsoft.com/office/drawing/2014/main" id="{F08F3B12-154E-4670-B75D-759B5FD6D622}"/>
-              </a:ext>
-            </a:extLst>
-          </p:cNvPr>
-          <p:cNvSpPr txBox="1"/>
-          <p:nvPr/>
-        </p:nvSpPr>
-        <p:spPr>
-          <a:xfrm>
-            <a:off x="10061942" y="3715922"/>
-            <a:ext cx="733337" cy="400110"/>
-          </a:xfrm>
-          <a:prstGeom prst="rect">
-            <a:avLst/>
-          </a:prstGeom>
-          <a:noFill/>
-        </p:spPr>
-        <p:txBody>
-          <a:bodyPr wrap="square" rtlCol="0">
-            <a:spAutoFit/>
-          </a:bodyPr>
-          <a:lstStyle/>
-          <a:p>
-            <a:r>
-              <a:rPr lang="en-US" sz="2000" b="1" i="1" dirty="0">
-                <a:solidFill>
-                  <a:schemeClr val="bg1"/>
-                </a:solidFill>
-              </a:rPr>
-              <a:t>YES!</a:t>
-            </a:r>
-          </a:p>
-        </p:txBody>
-      </p:sp>
-      <p:sp>
-        <p:nvSpPr>
           <p:cNvPr id="35" name="TextBox 34">
             <a:extLst>
               <a:ext uri="{FF2B5EF4-FFF2-40B4-BE49-F238E27FC236}">
@@ -4226,7 +4187,7 @@
                             </p:stCondLst>
                             <p:childTnLst>
                               <p:par>
-                                <p:cTn id="25" presetID="1" presetClass="entr" presetSubtype="0" fill="hold" grpId="0" nodeType="clickEffect">
+                                <p:cTn id="25" presetID="1" presetClass="entr" presetSubtype="0" fill="hold" nodeType="clickEffect">
                                   <p:stCondLst>
                                     <p:cond delay="0"/>
                                   </p:stCondLst>
@@ -4234,51 +4195,6 @@
                                     <p:set>
                                       <p:cBhvr>
                                         <p:cTn id="26" dur="1" fill="hold">
-                                          <p:stCondLst>
-                                            <p:cond delay="0"/>
-                                          </p:stCondLst>
-                                        </p:cTn>
-                                        <p:tgtEl>
-                                          <p:spTgt spid="27"/>
-                                        </p:tgtEl>
-                                        <p:attrNameLst>
-                                          <p:attrName>style.visibility</p:attrName>
-                                        </p:attrNameLst>
-                                      </p:cBhvr>
-                                      <p:to>
-                                        <p:strVal val="visible"/>
-                                      </p:to>
-                                    </p:set>
-                                  </p:childTnLst>
-                                </p:cTn>
-                              </p:par>
-                            </p:childTnLst>
-                          </p:cTn>
-                        </p:par>
-                      </p:childTnLst>
-                    </p:cTn>
-                  </p:par>
-                  <p:par>
-                    <p:cTn id="27" fill="hold">
-                      <p:stCondLst>
-                        <p:cond delay="indefinite"/>
-                      </p:stCondLst>
-                      <p:childTnLst>
-                        <p:par>
-                          <p:cTn id="28" fill="hold">
-                            <p:stCondLst>
-                              <p:cond delay="0"/>
-                            </p:stCondLst>
-                            <p:childTnLst>
-                              <p:par>
-                                <p:cTn id="29" presetID="1" presetClass="entr" presetSubtype="0" fill="hold" nodeType="clickEffect">
-                                  <p:stCondLst>
-                                    <p:cond delay="0"/>
-                                  </p:stCondLst>
-                                  <p:childTnLst>
-                                    <p:set>
-                                      <p:cBhvr>
-                                        <p:cTn id="30" dur="1" fill="hold">
                                           <p:stCondLst>
                                             <p:cond delay="0"/>
                                           </p:stCondLst>
@@ -4298,14 +4214,14 @@
                                 </p:cTn>
                               </p:par>
                               <p:par>
-                                <p:cTn id="31" presetID="1" presetClass="entr" presetSubtype="0" fill="hold" grpId="0" nodeType="withEffect">
+                                <p:cTn id="27" presetID="1" presetClass="entr" presetSubtype="0" fill="hold" grpId="0" nodeType="withEffect">
                                   <p:stCondLst>
                                     <p:cond delay="0"/>
                                   </p:stCondLst>
                                   <p:childTnLst>
                                     <p:set>
                                       <p:cBhvr>
-                                        <p:cTn id="32" dur="1" fill="hold">
+                                        <p:cTn id="28" dur="1" fill="hold">
                                           <p:stCondLst>
                                             <p:cond delay="0"/>
                                           </p:stCondLst>
@@ -4352,7 +4268,6 @@
       </p:par>
     </p:tnLst>
     <p:bldLst>
-      <p:bldP spid="27" grpId="0"/>
       <p:bldP spid="49" grpId="0"/>
     </p:bldLst>
   </p:timing>
@@ -4378,6 +4293,52 @@
       </p:grpSpPr>
       <p:pic>
         <p:nvPicPr>
+          <p:cNvPr id="9" name="Picture 2" descr="Curvy road landscape background illustration">
+            <a:extLst>
+              <a:ext uri="{FF2B5EF4-FFF2-40B4-BE49-F238E27FC236}">
+                <a16:creationId xmlns:a16="http://schemas.microsoft.com/office/drawing/2014/main" id="{E04622C2-8EEF-48CF-B0BB-DA5D62DC3B5F}"/>
+              </a:ext>
+            </a:extLst>
+          </p:cNvPr>
+          <p:cNvPicPr>
+            <a:picLocks noChangeAspect="1" noChangeArrowheads="1"/>
+          </p:cNvPicPr>
+          <p:nvPr/>
+        </p:nvPicPr>
+        <p:blipFill rotWithShape="1">
+          <a:blip r:embed="rId2">
+            <a:alphaModFix amt="60000"/>
+            <a:extLst>
+              <a:ext uri="{28A0092B-C50C-407E-A947-70E740481C1C}">
+                <a14:useLocalDpi xmlns:a14="http://schemas.microsoft.com/office/drawing/2010/main" val="0"/>
+              </a:ext>
+            </a:extLst>
+          </a:blip>
+          <a:srcRect l="5668" r="12540" b="1"/>
+          <a:stretch/>
+        </p:blipFill>
+        <p:spPr bwMode="auto">
+          <a:xfrm>
+            <a:off x="-6338" y="1282"/>
+            <a:ext cx="12191980" cy="6856718"/>
+          </a:xfrm>
+          <a:prstGeom prst="rect">
+            <a:avLst/>
+          </a:prstGeom>
+          <a:noFill/>
+          <a:extLst>
+            <a:ext uri="{909E8E84-426E-40DD-AFC4-6F175D3DCCD1}">
+              <a14:hiddenFill xmlns:a14="http://schemas.microsoft.com/office/drawing/2010/main">
+                <a:solidFill>
+                  <a:srgbClr val="FFFFFF"/>
+                </a:solidFill>
+              </a14:hiddenFill>
+            </a:ext>
+          </a:extLst>
+        </p:spPr>
+      </p:pic>
+      <p:pic>
+        <p:nvPicPr>
           <p:cNvPr id="2" name="Picture 1" descr="Chart, histogram&#10;&#10;Description automatically generated">
             <a:hlinkClick r:id="" action="ppaction://hlinkshowjump?jump=previousslide"/>
             <a:extLst>
@@ -4392,7 +4353,7 @@
           <p:nvPr/>
         </p:nvPicPr>
         <p:blipFill>
-          <a:blip r:embed="rId2">
+          <a:blip r:embed="rId3">
             <a:extLst>
               <a:ext uri="{28A0092B-C50C-407E-A947-70E740481C1C}">
                 <a14:useLocalDpi xmlns:a14="http://schemas.microsoft.com/office/drawing/2010/main" val="0"/>
@@ -4405,12 +4366,20 @@
         </p:blipFill>
         <p:spPr>
           <a:xfrm>
-            <a:off x="218774" y="191774"/>
-            <a:ext cx="3538407" cy="3021660"/>
+            <a:off x="262640" y="1321914"/>
+            <a:ext cx="5168656" cy="4413828"/>
           </a:xfrm>
           <a:prstGeom prst="rect">
             <a:avLst/>
           </a:prstGeom>
+          <a:ln w="25400">
+            <a:solidFill>
+              <a:schemeClr val="accent1"/>
+            </a:solidFill>
+          </a:ln>
+          <a:effectLst>
+            <a:softEdge rad="12700"/>
+          </a:effectLst>
         </p:spPr>
       </p:pic>
       <p:pic>
@@ -4428,7 +4397,7 @@
           <p:nvPr/>
         </p:nvPicPr>
         <p:blipFill>
-          <a:blip r:embed="rId3">
+          <a:blip r:embed="rId4">
             <a:extLst>
               <a:ext uri="{28A0092B-C50C-407E-A947-70E740481C1C}">
                 <a14:useLocalDpi xmlns:a14="http://schemas.microsoft.com/office/drawing/2010/main" val="0"/>
@@ -4441,12 +4410,24 @@
         </p:blipFill>
         <p:spPr>
           <a:xfrm>
-            <a:off x="5110814" y="509613"/>
-            <a:ext cx="1448002" cy="1705213"/>
+            <a:off x="6096000" y="632209"/>
+            <a:ext cx="2316092" cy="2542051"/>
           </a:xfrm>
           <a:prstGeom prst="rect">
             <a:avLst/>
           </a:prstGeom>
+          <a:ln w="25400">
+            <a:solidFill>
+              <a:schemeClr val="accent1"/>
+            </a:solidFill>
+          </a:ln>
+          <a:effectLst>
+            <a:outerShdw blurRad="50800" dist="38100" dir="2700000" algn="tl" rotWithShape="0">
+              <a:prstClr val="black">
+                <a:alpha val="40000"/>
+              </a:prstClr>
+            </a:outerShdw>
+          </a:effectLst>
         </p:spPr>
       </p:pic>
       <p:pic>
@@ -4464,7 +4445,7 @@
           <p:nvPr/>
         </p:nvPicPr>
         <p:blipFill>
-          <a:blip r:embed="rId4">
+          <a:blip r:embed="rId5">
             <a:extLst>
               <a:ext uri="{28A0092B-C50C-407E-A947-70E740481C1C}">
                 <a14:useLocalDpi xmlns:a14="http://schemas.microsoft.com/office/drawing/2010/main" val="0"/>
@@ -4477,14 +4458,177 @@
         </p:blipFill>
         <p:spPr>
           <a:xfrm>
-            <a:off x="7455714" y="547719"/>
-            <a:ext cx="1495634" cy="1629002"/>
+            <a:off x="6089652" y="3942170"/>
+            <a:ext cx="2316092" cy="2522621"/>
           </a:xfrm>
           <a:prstGeom prst="rect">
             <a:avLst/>
           </a:prstGeom>
+          <a:ln w="25400">
+            <a:solidFill>
+              <a:schemeClr val="accent1"/>
+            </a:solidFill>
+          </a:ln>
+          <a:effectLst>
+            <a:outerShdw blurRad="50800" dist="38100" dir="2700000" algn="tl" rotWithShape="0">
+              <a:prstClr val="black">
+                <a:alpha val="40000"/>
+              </a:prstClr>
+            </a:outerShdw>
+          </a:effectLst>
         </p:spPr>
       </p:pic>
+      <p:sp>
+        <p:nvSpPr>
+          <p:cNvPr id="6" name="TextBox 5">
+            <a:extLst>
+              <a:ext uri="{FF2B5EF4-FFF2-40B4-BE49-F238E27FC236}">
+                <a16:creationId xmlns:a16="http://schemas.microsoft.com/office/drawing/2014/main" id="{ABDAB5EB-F707-41C5-8DBE-C606D4EA4EFC}"/>
+              </a:ext>
+            </a:extLst>
+          </p:cNvPr>
+          <p:cNvSpPr txBox="1"/>
+          <p:nvPr/>
+        </p:nvSpPr>
+        <p:spPr>
+          <a:xfrm>
+            <a:off x="1099751" y="2223475"/>
+            <a:ext cx="3263751" cy="369332"/>
+          </a:xfrm>
+          <a:prstGeom prst="rect">
+            <a:avLst/>
+          </a:prstGeom>
+          <a:solidFill>
+            <a:schemeClr val="bg1"/>
+          </a:solidFill>
+        </p:spPr>
+        <p:txBody>
+          <a:bodyPr wrap="square" rtlCol="0">
+            <a:spAutoFit/>
+          </a:bodyPr>
+          <a:lstStyle/>
+          <a:p>
+            <a:pPr algn="ctr"/>
+            <a:r>
+              <a:rPr lang="en-US" b="1" dirty="0"/>
+              <a:t>Number of Trails per State</a:t>
+            </a:r>
+          </a:p>
+        </p:txBody>
+      </p:sp>
+      <p:sp>
+        <p:nvSpPr>
+          <p:cNvPr id="7" name="TextBox 6">
+            <a:extLst>
+              <a:ext uri="{FF2B5EF4-FFF2-40B4-BE49-F238E27FC236}">
+                <a16:creationId xmlns:a16="http://schemas.microsoft.com/office/drawing/2014/main" id="{5717E5BD-6DC3-4BED-8724-63C20157AA11}"/>
+              </a:ext>
+            </a:extLst>
+          </p:cNvPr>
+          <p:cNvSpPr txBox="1"/>
+          <p:nvPr/>
+        </p:nvSpPr>
+        <p:spPr>
+          <a:xfrm>
+            <a:off x="8604886" y="1164570"/>
+            <a:ext cx="3022349" cy="1477328"/>
+          </a:xfrm>
+          <a:prstGeom prst="rect">
+            <a:avLst/>
+          </a:prstGeom>
+          <a:solidFill>
+            <a:schemeClr val="bg1"/>
+          </a:solidFill>
+          <a:ln w="25400">
+            <a:solidFill>
+              <a:schemeClr val="accent1"/>
+            </a:solidFill>
+          </a:ln>
+        </p:spPr>
+        <p:txBody>
+          <a:bodyPr wrap="square" rtlCol="0">
+            <a:spAutoFit/>
+          </a:bodyPr>
+          <a:lstStyle/>
+          <a:p>
+            <a:pPr algn="ctr"/>
+            <a:r>
+              <a:rPr lang="en-US" b="1" dirty="0"/>
+              <a:t>AVERAGE RATING</a:t>
+            </a:r>
+          </a:p>
+          <a:p>
+            <a:r>
+              <a:rPr lang="en-US" dirty="0"/>
+              <a:t>The average ratings are very tightly distributed.  Difficult to distinguish excellent vs good trails.</a:t>
+            </a:r>
+          </a:p>
+        </p:txBody>
+      </p:sp>
+      <p:sp>
+        <p:nvSpPr>
+          <p:cNvPr id="8" name="TextBox 7">
+            <a:extLst>
+              <a:ext uri="{FF2B5EF4-FFF2-40B4-BE49-F238E27FC236}">
+                <a16:creationId xmlns:a16="http://schemas.microsoft.com/office/drawing/2014/main" id="{73D19C91-2806-4A48-AD0D-E56A9830DA97}"/>
+              </a:ext>
+            </a:extLst>
+          </p:cNvPr>
+          <p:cNvSpPr txBox="1"/>
+          <p:nvPr/>
+        </p:nvSpPr>
+        <p:spPr>
+          <a:xfrm>
+            <a:off x="8543101" y="4073679"/>
+            <a:ext cx="3442951" cy="2246769"/>
+          </a:xfrm>
+          <a:prstGeom prst="rect">
+            <a:avLst/>
+          </a:prstGeom>
+          <a:solidFill>
+            <a:schemeClr val="bg1"/>
+          </a:solidFill>
+          <a:ln w="25400">
+            <a:solidFill>
+              <a:schemeClr val="accent1"/>
+            </a:solidFill>
+          </a:ln>
+        </p:spPr>
+        <p:txBody>
+          <a:bodyPr wrap="square" rtlCol="0">
+            <a:spAutoFit/>
+          </a:bodyPr>
+          <a:lstStyle/>
+          <a:p>
+            <a:pPr algn="ctr"/>
+            <a:r>
+              <a:rPr lang="en-US" b="1" dirty="0"/>
+              <a:t>NUMBER OF REVIEWS</a:t>
+            </a:r>
+          </a:p>
+          <a:p>
+            <a:endParaRPr lang="en-US" dirty="0"/>
+          </a:p>
+          <a:p>
+            <a:r>
+              <a:rPr lang="en-US" dirty="0"/>
+              <a:t>Trail popularity, based on the number of reviews,  shows variation.  </a:t>
+            </a:r>
+          </a:p>
+          <a:p>
+            <a:endParaRPr lang="en-US" dirty="0"/>
+          </a:p>
+          <a:p>
+            <a:r>
+              <a:rPr lang="en-US" dirty="0"/>
+              <a:t>What’s driving a trail’s popularity?</a:t>
+            </a:r>
+          </a:p>
+          <a:p>
+            <a:endParaRPr lang="en-US" sz="1400" dirty="0"/>
+          </a:p>
+        </p:txBody>
+      </p:sp>
     </p:spTree>
     <p:extLst>
       <p:ext uri="{BB962C8B-B14F-4D97-AF65-F5344CB8AC3E}">
@@ -4495,12 +4639,155 @@
   <p:clrMapOvr>
     <a:masterClrMapping/>
   </p:clrMapOvr>
+  <p:timing>
+    <p:tnLst>
+      <p:par>
+        <p:cTn id="1" dur="indefinite" restart="never" nodeType="tmRoot">
+          <p:childTnLst>
+            <p:seq concurrent="1" nextAc="seek">
+              <p:cTn id="2" dur="indefinite" nodeType="mainSeq">
+                <p:childTnLst>
+                  <p:par>
+                    <p:cTn id="3" fill="hold">
+                      <p:stCondLst>
+                        <p:cond delay="indefinite"/>
+                        <p:cond evt="onBegin" delay="0">
+                          <p:tn val="2"/>
+                        </p:cond>
+                      </p:stCondLst>
+                      <p:childTnLst>
+                        <p:par>
+                          <p:cTn id="4" fill="hold">
+                            <p:stCondLst>
+                              <p:cond delay="0"/>
+                            </p:stCondLst>
+                            <p:childTnLst>
+                              <p:par>
+                                <p:cTn id="5" presetID="1" presetClass="entr" presetSubtype="0" fill="hold" nodeType="withEffect">
+                                  <p:stCondLst>
+                                    <p:cond delay="0"/>
+                                  </p:stCondLst>
+                                  <p:childTnLst>
+                                    <p:set>
+                                      <p:cBhvr>
+                                        <p:cTn id="6" dur="1" fill="hold">
+                                          <p:stCondLst>
+                                            <p:cond delay="0"/>
+                                          </p:stCondLst>
+                                        </p:cTn>
+                                        <p:tgtEl>
+                                          <p:spTgt spid="4"/>
+                                        </p:tgtEl>
+                                        <p:attrNameLst>
+                                          <p:attrName>style.visibility</p:attrName>
+                                        </p:attrNameLst>
+                                      </p:cBhvr>
+                                      <p:to>
+                                        <p:strVal val="visible"/>
+                                      </p:to>
+                                    </p:set>
+                                  </p:childTnLst>
+                                </p:cTn>
+                              </p:par>
+                              <p:par>
+                                <p:cTn id="7" presetID="1" presetClass="entr" presetSubtype="0" fill="hold" grpId="0" nodeType="withEffect">
+                                  <p:stCondLst>
+                                    <p:cond delay="0"/>
+                                  </p:stCondLst>
+                                  <p:childTnLst>
+                                    <p:set>
+                                      <p:cBhvr>
+                                        <p:cTn id="8" dur="1" fill="hold">
+                                          <p:stCondLst>
+                                            <p:cond delay="0"/>
+                                          </p:stCondLst>
+                                        </p:cTn>
+                                        <p:tgtEl>
+                                          <p:spTgt spid="7"/>
+                                        </p:tgtEl>
+                                        <p:attrNameLst>
+                                          <p:attrName>style.visibility</p:attrName>
+                                        </p:attrNameLst>
+                                      </p:cBhvr>
+                                      <p:to>
+                                        <p:strVal val="visible"/>
+                                      </p:to>
+                                    </p:set>
+                                  </p:childTnLst>
+                                </p:cTn>
+                              </p:par>
+                              <p:par>
+                                <p:cTn id="9" presetID="1" presetClass="entr" presetSubtype="0" fill="hold" nodeType="withEffect">
+                                  <p:stCondLst>
+                                    <p:cond delay="0"/>
+                                  </p:stCondLst>
+                                  <p:childTnLst>
+                                    <p:set>
+                                      <p:cBhvr>
+                                        <p:cTn id="10" dur="1" fill="hold">
+                                          <p:stCondLst>
+                                            <p:cond delay="0"/>
+                                          </p:stCondLst>
+                                        </p:cTn>
+                                        <p:tgtEl>
+                                          <p:spTgt spid="5"/>
+                                        </p:tgtEl>
+                                        <p:attrNameLst>
+                                          <p:attrName>style.visibility</p:attrName>
+                                        </p:attrNameLst>
+                                      </p:cBhvr>
+                                      <p:to>
+                                        <p:strVal val="visible"/>
+                                      </p:to>
+                                    </p:set>
+                                  </p:childTnLst>
+                                </p:cTn>
+                              </p:par>
+                            </p:childTnLst>
+                          </p:cTn>
+                        </p:par>
+                      </p:childTnLst>
+                    </p:cTn>
+                  </p:par>
+                </p:childTnLst>
+              </p:cTn>
+              <p:prevCondLst>
+                <p:cond evt="onPrev" delay="0">
+                  <p:tgtEl>
+                    <p:sldTgt/>
+                  </p:tgtEl>
+                </p:cond>
+              </p:prevCondLst>
+              <p:nextCondLst>
+                <p:cond evt="onNext" delay="0">
+                  <p:tgtEl>
+                    <p:sldTgt/>
+                  </p:tgtEl>
+                </p:cond>
+              </p:nextCondLst>
+            </p:seq>
+          </p:childTnLst>
+        </p:cTn>
+      </p:par>
+    </p:tnLst>
+    <p:bldLst>
+      <p:bldP spid="7" grpId="0" animBg="1"/>
+    </p:bldLst>
+  </p:timing>
 </p:sld>
 </file>
 
 <file path=ppt/slides/slide3.xml><?xml version="1.0" encoding="utf-8"?>
 <p:sld xmlns:a="http://schemas.openxmlformats.org/drawingml/2006/main" xmlns:r="http://schemas.openxmlformats.org/officeDocument/2006/relationships" xmlns:p="http://schemas.openxmlformats.org/presentationml/2006/main">
   <p:cSld>
+    <p:bg>
+      <p:bgPr>
+        <a:solidFill>
+          <a:schemeClr val="bg1"/>
+        </a:solidFill>
+        <a:effectLst/>
+      </p:bgPr>
+    </p:bg>
     <p:spTree>
       <p:nvGrpSpPr>
         <p:cNvPr id="1" name=""/>
@@ -4517,11 +4804,57 @@
       </p:grpSpPr>
       <p:pic>
         <p:nvPicPr>
-          <p:cNvPr id="3" name="Picture 2" descr="Table&#10;&#10;Description automatically generated">
-            <a:hlinkClick r:id="" action="ppaction://hlinkshowjump?jump=firstslide"/>
-            <a:extLst>
-              <a:ext uri="{FF2B5EF4-FFF2-40B4-BE49-F238E27FC236}">
-                <a16:creationId xmlns:a16="http://schemas.microsoft.com/office/drawing/2014/main" id="{6ACAF9D6-2D94-4D10-B84D-3F07177DED62}"/>
+          <p:cNvPr id="11" name="Picture 2" descr="Curvy road landscape background illustration">
+            <a:extLst>
+              <a:ext uri="{FF2B5EF4-FFF2-40B4-BE49-F238E27FC236}">
+                <a16:creationId xmlns:a16="http://schemas.microsoft.com/office/drawing/2014/main" id="{3E332D53-2A72-49B0-8CD3-CF7055144631}"/>
+              </a:ext>
+            </a:extLst>
+          </p:cNvPr>
+          <p:cNvPicPr>
+            <a:picLocks noChangeAspect="1" noChangeArrowheads="1"/>
+          </p:cNvPicPr>
+          <p:nvPr/>
+        </p:nvPicPr>
+        <p:blipFill rotWithShape="1">
+          <a:blip r:embed="rId2">
+            <a:alphaModFix amt="60000"/>
+            <a:extLst>
+              <a:ext uri="{28A0092B-C50C-407E-A947-70E740481C1C}">
+                <a14:useLocalDpi xmlns:a14="http://schemas.microsoft.com/office/drawing/2010/main" val="0"/>
+              </a:ext>
+            </a:extLst>
+          </a:blip>
+          <a:srcRect l="5668" r="12540" b="1"/>
+          <a:stretch/>
+        </p:blipFill>
+        <p:spPr bwMode="auto">
+          <a:xfrm>
+            <a:off x="-6338" y="1282"/>
+            <a:ext cx="12191980" cy="6856718"/>
+          </a:xfrm>
+          <a:prstGeom prst="rect">
+            <a:avLst/>
+          </a:prstGeom>
+          <a:noFill/>
+          <a:extLst>
+            <a:ext uri="{909E8E84-426E-40DD-AFC4-6F175D3DCCD1}">
+              <a14:hiddenFill xmlns:a14="http://schemas.microsoft.com/office/drawing/2010/main">
+                <a:solidFill>
+                  <a:srgbClr val="FFFFFF"/>
+                </a:solidFill>
+              </a14:hiddenFill>
+            </a:ext>
+          </a:extLst>
+        </p:spPr>
+      </p:pic>
+      <p:pic>
+        <p:nvPicPr>
+          <p:cNvPr id="8" name="Picture 7" descr="A picture containing clipart&#10;&#10;Description automatically generated">
+            <a:hlinkClick r:id="rId3" action="ppaction://hlinksldjump"/>
+            <a:extLst>
+              <a:ext uri="{FF2B5EF4-FFF2-40B4-BE49-F238E27FC236}">
+                <a16:creationId xmlns:a16="http://schemas.microsoft.com/office/drawing/2014/main" id="{39D630E5-7048-4542-A2E7-AE5BC176AD7C}"/>
               </a:ext>
             </a:extLst>
           </p:cNvPr>
@@ -4531,7 +4864,7 @@
           <p:nvPr/>
         </p:nvPicPr>
         <p:blipFill>
-          <a:blip r:embed="rId2">
+          <a:blip r:embed="rId4">
             <a:extLst>
               <a:ext uri="{28A0092B-C50C-407E-A947-70E740481C1C}">
                 <a14:useLocalDpi xmlns:a14="http://schemas.microsoft.com/office/drawing/2010/main" val="0"/>
@@ -4544,8 +4877,147 @@
         </p:blipFill>
         <p:spPr>
           <a:xfrm>
-            <a:off x="430762" y="356950"/>
-            <a:ext cx="4410691" cy="3400900"/>
+            <a:off x="4414906" y="1126600"/>
+            <a:ext cx="3331709" cy="4604800"/>
+          </a:xfrm>
+          <a:prstGeom prst="rect">
+            <a:avLst/>
+          </a:prstGeom>
+        </p:spPr>
+      </p:pic>
+      <p:cxnSp>
+        <p:nvCxnSpPr>
+          <p:cNvPr id="15" name="Straight Connector 14">
+            <a:extLst>
+              <a:ext uri="{FF2B5EF4-FFF2-40B4-BE49-F238E27FC236}">
+                <a16:creationId xmlns:a16="http://schemas.microsoft.com/office/drawing/2014/main" id="{DCD67800-37AC-4E14-89B0-F79DCB3FB86D}"/>
+              </a:ext>
+              <a:ext uri="{C183D7F6-B498-43B3-948B-1728B52AA6E4}">
+                <adec:decorative xmlns:adec="http://schemas.microsoft.com/office/drawing/2017/decorative" val="1"/>
+              </a:ext>
+            </a:extLst>
+          </p:cNvPr>
+          <p:cNvCxnSpPr>
+            <a:cxnSpLocks noGrp="1" noRot="1" noChangeAspect="1" noMove="1" noResize="1" noEditPoints="1" noAdjustHandles="1" noChangeArrowheads="1" noChangeShapeType="1"/>
+          </p:cNvCxnSpPr>
+          <p:nvPr>
+            <p:extLst>
+              <p:ext uri="{386F3935-93C4-4BCD-93E2-E3B085C9AB24}">
+                <p16:designElem xmlns:p16="http://schemas.microsoft.com/office/powerpoint/2015/main" val="1"/>
+              </p:ext>
+            </p:extLst>
+          </p:nvPr>
+        </p:nvCxnSpPr>
+        <p:spPr>
+          <a:xfrm>
+            <a:off x="4165600" y="1573887"/>
+            <a:ext cx="0" cy="3710227"/>
+          </a:xfrm>
+          <a:prstGeom prst="line">
+            <a:avLst/>
+          </a:prstGeom>
+          <a:ln w="19050">
+            <a:solidFill>
+              <a:srgbClr val="7F7F7F"/>
+            </a:solidFill>
+          </a:ln>
+        </p:spPr>
+        <p:style>
+          <a:lnRef idx="1">
+            <a:schemeClr val="accent1"/>
+          </a:lnRef>
+          <a:fillRef idx="0">
+            <a:schemeClr val="accent1"/>
+          </a:fillRef>
+          <a:effectRef idx="0">
+            <a:schemeClr val="accent1"/>
+          </a:effectRef>
+          <a:fontRef idx="minor">
+            <a:schemeClr val="tx1"/>
+          </a:fontRef>
+        </p:style>
+      </p:cxnSp>
+      <p:cxnSp>
+        <p:nvCxnSpPr>
+          <p:cNvPr id="17" name="Straight Connector 16">
+            <a:extLst>
+              <a:ext uri="{FF2B5EF4-FFF2-40B4-BE49-F238E27FC236}">
+                <a16:creationId xmlns:a16="http://schemas.microsoft.com/office/drawing/2014/main" id="{20F1788F-A5AE-4188-8274-F7F2E3833ECD}"/>
+              </a:ext>
+              <a:ext uri="{C183D7F6-B498-43B3-948B-1728B52AA6E4}">
+                <adec:decorative xmlns:adec="http://schemas.microsoft.com/office/drawing/2017/decorative" val="1"/>
+              </a:ext>
+            </a:extLst>
+          </p:cNvPr>
+          <p:cNvCxnSpPr>
+            <a:cxnSpLocks noGrp="1" noRot="1" noChangeAspect="1" noMove="1" noResize="1" noEditPoints="1" noAdjustHandles="1" noChangeArrowheads="1" noChangeShapeType="1"/>
+          </p:cNvCxnSpPr>
+          <p:nvPr>
+            <p:extLst>
+              <p:ext uri="{386F3935-93C4-4BCD-93E2-E3B085C9AB24}">
+                <p16:designElem xmlns:p16="http://schemas.microsoft.com/office/powerpoint/2015/main" val="1"/>
+              </p:ext>
+            </p:extLst>
+          </p:nvPr>
+        </p:nvCxnSpPr>
+        <p:spPr>
+          <a:xfrm>
+            <a:off x="7995920" y="1573887"/>
+            <a:ext cx="0" cy="3710227"/>
+          </a:xfrm>
+          <a:prstGeom prst="line">
+            <a:avLst/>
+          </a:prstGeom>
+          <a:ln w="19050">
+            <a:solidFill>
+              <a:srgbClr val="7F7F7F"/>
+            </a:solidFill>
+          </a:ln>
+        </p:spPr>
+        <p:style>
+          <a:lnRef idx="1">
+            <a:schemeClr val="accent1"/>
+          </a:lnRef>
+          <a:fillRef idx="0">
+            <a:schemeClr val="accent1"/>
+          </a:fillRef>
+          <a:effectRef idx="0">
+            <a:schemeClr val="accent1"/>
+          </a:effectRef>
+          <a:fontRef idx="minor">
+            <a:schemeClr val="tx1"/>
+          </a:fontRef>
+        </p:style>
+      </p:cxnSp>
+      <p:pic>
+        <p:nvPicPr>
+          <p:cNvPr id="5" name="Picture 4" descr="Text&#10;&#10;Description automatically generated">
+            <a:extLst>
+              <a:ext uri="{FF2B5EF4-FFF2-40B4-BE49-F238E27FC236}">
+                <a16:creationId xmlns:a16="http://schemas.microsoft.com/office/drawing/2014/main" id="{F8EAA841-3250-49B4-A84E-8FE69CF49BBF}"/>
+              </a:ext>
+            </a:extLst>
+          </p:cNvPr>
+          <p:cNvPicPr>
+            <a:picLocks noChangeAspect="1"/>
+          </p:cNvPicPr>
+          <p:nvPr/>
+        </p:nvPicPr>
+        <p:blipFill rotWithShape="1">
+          <a:blip r:embed="rId5">
+            <a:extLst>
+              <a:ext uri="{28A0092B-C50C-407E-A947-70E740481C1C}">
+                <a14:useLocalDpi xmlns:a14="http://schemas.microsoft.com/office/drawing/2010/main" val="0"/>
+              </a:ext>
+            </a:extLst>
+          </a:blip>
+          <a:srcRect t="734" r="2" b="2"/>
+          <a:stretch/>
+        </p:blipFill>
+        <p:spPr>
+          <a:xfrm>
+            <a:off x="8272298" y="1303513"/>
+            <a:ext cx="3738719" cy="4250974"/>
           </a:xfrm>
           <a:prstGeom prst="rect">
             <a:avLst/>
@@ -4554,10 +5026,10 @@
       </p:pic>
       <p:pic>
         <p:nvPicPr>
-          <p:cNvPr id="5" name="Picture 4" descr="Text&#10;&#10;Description automatically generated">
-            <a:extLst>
-              <a:ext uri="{FF2B5EF4-FFF2-40B4-BE49-F238E27FC236}">
-                <a16:creationId xmlns:a16="http://schemas.microsoft.com/office/drawing/2014/main" id="{F8EAA841-3250-49B4-A84E-8FE69CF49BBF}"/>
+          <p:cNvPr id="4" name="Picture 3" descr="Table&#10;&#10;Description automatically generated">
+            <a:extLst>
+              <a:ext uri="{FF2B5EF4-FFF2-40B4-BE49-F238E27FC236}">
+                <a16:creationId xmlns:a16="http://schemas.microsoft.com/office/drawing/2014/main" id="{2B4E5407-871B-4104-AB9E-BE945B82A98F}"/>
               </a:ext>
             </a:extLst>
           </p:cNvPr>
@@ -4567,7 +5039,7 @@
           <p:nvPr/>
         </p:nvPicPr>
         <p:blipFill>
-          <a:blip r:embed="rId3">
+          <a:blip r:embed="rId6">
             <a:extLst>
               <a:ext uri="{28A0092B-C50C-407E-A947-70E740481C1C}">
                 <a14:useLocalDpi xmlns:a14="http://schemas.microsoft.com/office/drawing/2010/main" val="0"/>
@@ -4580,8 +5052,8 @@
         </p:blipFill>
         <p:spPr>
           <a:xfrm>
-            <a:off x="5932446" y="242252"/>
-            <a:ext cx="5896798" cy="6258798"/>
+            <a:off x="106332" y="1939063"/>
+            <a:ext cx="3854851" cy="2979874"/>
           </a:xfrm>
           <a:prstGeom prst="rect">
             <a:avLst/>
@@ -4598,6 +5070,81 @@
   <p:clrMapOvr>
     <a:masterClrMapping/>
   </p:clrMapOvr>
+  <p:timing>
+    <p:tnLst>
+      <p:par>
+        <p:cTn id="1" dur="indefinite" restart="never" nodeType="tmRoot">
+          <p:childTnLst>
+            <p:seq concurrent="1" nextAc="seek">
+              <p:cTn id="2" dur="indefinite" nodeType="mainSeq">
+                <p:childTnLst>
+                  <p:par>
+                    <p:cTn id="3" fill="hold">
+                      <p:stCondLst>
+                        <p:cond delay="indefinite"/>
+                      </p:stCondLst>
+                      <p:childTnLst>
+                        <p:par>
+                          <p:cTn id="4" fill="hold">
+                            <p:stCondLst>
+                              <p:cond delay="0"/>
+                            </p:stCondLst>
+                            <p:childTnLst>
+                              <p:par>
+                                <p:cTn id="5" presetID="1" presetClass="entr" presetSubtype="0" fill="hold" nodeType="clickEffect">
+                                  <p:stCondLst>
+                                    <p:cond delay="0"/>
+                                  </p:stCondLst>
+                                  <p:childTnLst>
+                                    <p:set>
+                                      <p:cBhvr>
+                                        <p:cTn id="6" dur="1" fill="hold">
+                                          <p:stCondLst>
+                                            <p:cond delay="0"/>
+                                          </p:stCondLst>
+                                        </p:cTn>
+                                        <p:tgtEl>
+                                          <p:spTgt spid="8"/>
+                                        </p:tgtEl>
+                                        <p:attrNameLst>
+                                          <p:attrName>style.visibility</p:attrName>
+                                        </p:attrNameLst>
+                                      </p:cBhvr>
+                                      <p:to>
+                                        <p:strVal val="visible"/>
+                                      </p:to>
+                                    </p:set>
+                                  </p:childTnLst>
+                                </p:cTn>
+                              </p:par>
+                            </p:childTnLst>
+                          </p:cTn>
+                        </p:par>
+                      </p:childTnLst>
+                    </p:cTn>
+                  </p:par>
+                </p:childTnLst>
+              </p:cTn>
+              <p:prevCondLst>
+                <p:cond evt="onPrev" delay="0">
+                  <p:tgtEl>
+                    <p:sldTgt/>
+                  </p:tgtEl>
+                </p:cond>
+              </p:prevCondLst>
+              <p:nextCondLst>
+                <p:cond evt="onNext" delay="0">
+                  <p:tgtEl>
+                    <p:sldTgt/>
+                  </p:tgtEl>
+                </p:cond>
+              </p:nextCondLst>
+            </p:seq>
+          </p:childTnLst>
+        </p:cTn>
+      </p:par>
+    </p:tnLst>
+  </p:timing>
 </p:sld>
 </file>
 

</xml_diff>

<commit_message>
Uploading SUPER AWESOME TEAM
</commit_message>
<xml_diff>
--- a/Our Journey.pptx
+++ b/Our Journey.pptx
@@ -273,7 +273,7 @@
           <a:p>
             <a:fld id="{5F2083BC-6AFF-45AA-A85F-42DE01D02571}" type="datetimeFigureOut">
               <a:rPr lang="en-US" smtClean="0"/>
-              <a:t>3/1/2022</a:t>
+              <a:t>3/4/2022</a:t>
             </a:fld>
             <a:endParaRPr lang="en-US"/>
           </a:p>
@@ -471,7 +471,7 @@
           <a:p>
             <a:fld id="{5F2083BC-6AFF-45AA-A85F-42DE01D02571}" type="datetimeFigureOut">
               <a:rPr lang="en-US" smtClean="0"/>
-              <a:t>3/1/2022</a:t>
+              <a:t>3/4/2022</a:t>
             </a:fld>
             <a:endParaRPr lang="en-US"/>
           </a:p>
@@ -679,7 +679,7 @@
           <a:p>
             <a:fld id="{5F2083BC-6AFF-45AA-A85F-42DE01D02571}" type="datetimeFigureOut">
               <a:rPr lang="en-US" smtClean="0"/>
-              <a:t>3/1/2022</a:t>
+              <a:t>3/4/2022</a:t>
             </a:fld>
             <a:endParaRPr lang="en-US"/>
           </a:p>
@@ -877,7 +877,7 @@
           <a:p>
             <a:fld id="{5F2083BC-6AFF-45AA-A85F-42DE01D02571}" type="datetimeFigureOut">
               <a:rPr lang="en-US" smtClean="0"/>
-              <a:t>3/1/2022</a:t>
+              <a:t>3/4/2022</a:t>
             </a:fld>
             <a:endParaRPr lang="en-US"/>
           </a:p>
@@ -1152,7 +1152,7 @@
           <a:p>
             <a:fld id="{5F2083BC-6AFF-45AA-A85F-42DE01D02571}" type="datetimeFigureOut">
               <a:rPr lang="en-US" smtClean="0"/>
-              <a:t>3/1/2022</a:t>
+              <a:t>3/4/2022</a:t>
             </a:fld>
             <a:endParaRPr lang="en-US"/>
           </a:p>
@@ -1417,7 +1417,7 @@
           <a:p>
             <a:fld id="{5F2083BC-6AFF-45AA-A85F-42DE01D02571}" type="datetimeFigureOut">
               <a:rPr lang="en-US" smtClean="0"/>
-              <a:t>3/1/2022</a:t>
+              <a:t>3/4/2022</a:t>
             </a:fld>
             <a:endParaRPr lang="en-US"/>
           </a:p>
@@ -1829,7 +1829,7 @@
           <a:p>
             <a:fld id="{5F2083BC-6AFF-45AA-A85F-42DE01D02571}" type="datetimeFigureOut">
               <a:rPr lang="en-US" smtClean="0"/>
-              <a:t>3/1/2022</a:t>
+              <a:t>3/4/2022</a:t>
             </a:fld>
             <a:endParaRPr lang="en-US"/>
           </a:p>
@@ -1970,7 +1970,7 @@
           <a:p>
             <a:fld id="{5F2083BC-6AFF-45AA-A85F-42DE01D02571}" type="datetimeFigureOut">
               <a:rPr lang="en-US" smtClean="0"/>
-              <a:t>3/1/2022</a:t>
+              <a:t>3/4/2022</a:t>
             </a:fld>
             <a:endParaRPr lang="en-US"/>
           </a:p>
@@ -2083,7 +2083,7 @@
           <a:p>
             <a:fld id="{5F2083BC-6AFF-45AA-A85F-42DE01D02571}" type="datetimeFigureOut">
               <a:rPr lang="en-US" smtClean="0"/>
-              <a:t>3/1/2022</a:t>
+              <a:t>3/4/2022</a:t>
             </a:fld>
             <a:endParaRPr lang="en-US"/>
           </a:p>
@@ -2394,7 +2394,7 @@
           <a:p>
             <a:fld id="{5F2083BC-6AFF-45AA-A85F-42DE01D02571}" type="datetimeFigureOut">
               <a:rPr lang="en-US" smtClean="0"/>
-              <a:t>3/1/2022</a:t>
+              <a:t>3/4/2022</a:t>
             </a:fld>
             <a:endParaRPr lang="en-US"/>
           </a:p>
@@ -2682,7 +2682,7 @@
           <a:p>
             <a:fld id="{5F2083BC-6AFF-45AA-A85F-42DE01D02571}" type="datetimeFigureOut">
               <a:rPr lang="en-US" smtClean="0"/>
-              <a:t>3/1/2022</a:t>
+              <a:t>3/4/2022</a:t>
             </a:fld>
             <a:endParaRPr lang="en-US"/>
           </a:p>
@@ -2923,7 +2923,7 @@
           <a:p>
             <a:fld id="{5F2083BC-6AFF-45AA-A85F-42DE01D02571}" type="datetimeFigureOut">
               <a:rPr lang="en-US" smtClean="0"/>
-              <a:t>3/1/2022</a:t>
+              <a:t>3/4/2022</a:t>
             </a:fld>
             <a:endParaRPr lang="en-US"/>
           </a:p>
@@ -4277,6 +4277,14 @@
 <file path=ppt/slides/slide2.xml><?xml version="1.0" encoding="utf-8"?>
 <p:sld xmlns:a="http://schemas.openxmlformats.org/drawingml/2006/main" xmlns:r="http://schemas.openxmlformats.org/officeDocument/2006/relationships" xmlns:p="http://schemas.openxmlformats.org/presentationml/2006/main">
   <p:cSld>
+    <p:bg>
+      <p:bgPr>
+        <a:solidFill>
+          <a:srgbClr val="466E6C"/>
+        </a:solidFill>
+        <a:effectLst/>
+      </p:bgPr>
+    </p:bg>
     <p:spTree>
       <p:nvGrpSpPr>
         <p:cNvPr id="1" name=""/>
@@ -4291,231 +4299,6 @@
           <a:chExt cx="0" cy="0"/>
         </a:xfrm>
       </p:grpSpPr>
-      <p:pic>
-        <p:nvPicPr>
-          <p:cNvPr id="9" name="Picture 2" descr="Curvy road landscape background illustration">
-            <a:extLst>
-              <a:ext uri="{FF2B5EF4-FFF2-40B4-BE49-F238E27FC236}">
-                <a16:creationId xmlns:a16="http://schemas.microsoft.com/office/drawing/2014/main" id="{E04622C2-8EEF-48CF-B0BB-DA5D62DC3B5F}"/>
-              </a:ext>
-            </a:extLst>
-          </p:cNvPr>
-          <p:cNvPicPr>
-            <a:picLocks noChangeAspect="1" noChangeArrowheads="1"/>
-          </p:cNvPicPr>
-          <p:nvPr/>
-        </p:nvPicPr>
-        <p:blipFill rotWithShape="1">
-          <a:blip r:embed="rId2">
-            <a:alphaModFix amt="60000"/>
-            <a:extLst>
-              <a:ext uri="{28A0092B-C50C-407E-A947-70E740481C1C}">
-                <a14:useLocalDpi xmlns:a14="http://schemas.microsoft.com/office/drawing/2010/main" val="0"/>
-              </a:ext>
-            </a:extLst>
-          </a:blip>
-          <a:srcRect l="5668" r="12540" b="1"/>
-          <a:stretch/>
-        </p:blipFill>
-        <p:spPr bwMode="auto">
-          <a:xfrm>
-            <a:off x="-6338" y="1282"/>
-            <a:ext cx="12191980" cy="6856718"/>
-          </a:xfrm>
-          <a:prstGeom prst="rect">
-            <a:avLst/>
-          </a:prstGeom>
-          <a:noFill/>
-          <a:extLst>
-            <a:ext uri="{909E8E84-426E-40DD-AFC4-6F175D3DCCD1}">
-              <a14:hiddenFill xmlns:a14="http://schemas.microsoft.com/office/drawing/2010/main">
-                <a:solidFill>
-                  <a:srgbClr val="FFFFFF"/>
-                </a:solidFill>
-              </a14:hiddenFill>
-            </a:ext>
-          </a:extLst>
-        </p:spPr>
-      </p:pic>
-      <p:pic>
-        <p:nvPicPr>
-          <p:cNvPr id="2" name="Picture 1" descr="Chart, histogram&#10;&#10;Description automatically generated">
-            <a:hlinkClick r:id="" action="ppaction://hlinkshowjump?jump=previousslide"/>
-            <a:extLst>
-              <a:ext uri="{FF2B5EF4-FFF2-40B4-BE49-F238E27FC236}">
-                <a16:creationId xmlns:a16="http://schemas.microsoft.com/office/drawing/2014/main" id="{D85F27E5-02E5-4A67-B62F-6E8679DFE8D7}"/>
-              </a:ext>
-            </a:extLst>
-          </p:cNvPr>
-          <p:cNvPicPr>
-            <a:picLocks noChangeAspect="1"/>
-          </p:cNvPicPr>
-          <p:nvPr/>
-        </p:nvPicPr>
-        <p:blipFill>
-          <a:blip r:embed="rId3">
-            <a:extLst>
-              <a:ext uri="{28A0092B-C50C-407E-A947-70E740481C1C}">
-                <a14:useLocalDpi xmlns:a14="http://schemas.microsoft.com/office/drawing/2010/main" val="0"/>
-              </a:ext>
-            </a:extLst>
-          </a:blip>
-          <a:stretch>
-            <a:fillRect/>
-          </a:stretch>
-        </p:blipFill>
-        <p:spPr>
-          <a:xfrm>
-            <a:off x="262640" y="1321914"/>
-            <a:ext cx="5168656" cy="4413828"/>
-          </a:xfrm>
-          <a:prstGeom prst="rect">
-            <a:avLst/>
-          </a:prstGeom>
-          <a:ln w="25400">
-            <a:solidFill>
-              <a:schemeClr val="accent1"/>
-            </a:solidFill>
-          </a:ln>
-          <a:effectLst>
-            <a:softEdge rad="12700"/>
-          </a:effectLst>
-        </p:spPr>
-      </p:pic>
-      <p:pic>
-        <p:nvPicPr>
-          <p:cNvPr id="4" name="Picture 3" descr="Text, table&#10;&#10;Description automatically generated with medium confidence">
-            <a:extLst>
-              <a:ext uri="{FF2B5EF4-FFF2-40B4-BE49-F238E27FC236}">
-                <a16:creationId xmlns:a16="http://schemas.microsoft.com/office/drawing/2014/main" id="{BD5BCDB8-CD24-44D1-9C46-12BC783A8773}"/>
-              </a:ext>
-            </a:extLst>
-          </p:cNvPr>
-          <p:cNvPicPr>
-            <a:picLocks noChangeAspect="1"/>
-          </p:cNvPicPr>
-          <p:nvPr/>
-        </p:nvPicPr>
-        <p:blipFill>
-          <a:blip r:embed="rId4">
-            <a:extLst>
-              <a:ext uri="{28A0092B-C50C-407E-A947-70E740481C1C}">
-                <a14:useLocalDpi xmlns:a14="http://schemas.microsoft.com/office/drawing/2010/main" val="0"/>
-              </a:ext>
-            </a:extLst>
-          </a:blip>
-          <a:stretch>
-            <a:fillRect/>
-          </a:stretch>
-        </p:blipFill>
-        <p:spPr>
-          <a:xfrm>
-            <a:off x="6096000" y="632209"/>
-            <a:ext cx="2316092" cy="2542051"/>
-          </a:xfrm>
-          <a:prstGeom prst="rect">
-            <a:avLst/>
-          </a:prstGeom>
-          <a:ln w="25400">
-            <a:solidFill>
-              <a:schemeClr val="accent1"/>
-            </a:solidFill>
-          </a:ln>
-          <a:effectLst>
-            <a:outerShdw blurRad="50800" dist="38100" dir="2700000" algn="tl" rotWithShape="0">
-              <a:prstClr val="black">
-                <a:alpha val="40000"/>
-              </a:prstClr>
-            </a:outerShdw>
-          </a:effectLst>
-        </p:spPr>
-      </p:pic>
-      <p:pic>
-        <p:nvPicPr>
-          <p:cNvPr id="5" name="Picture 4" descr="Text&#10;&#10;Description automatically generated">
-            <a:extLst>
-              <a:ext uri="{FF2B5EF4-FFF2-40B4-BE49-F238E27FC236}">
-                <a16:creationId xmlns:a16="http://schemas.microsoft.com/office/drawing/2014/main" id="{747AFBD1-D164-4549-B370-4C3DDEFB6F81}"/>
-              </a:ext>
-            </a:extLst>
-          </p:cNvPr>
-          <p:cNvPicPr>
-            <a:picLocks noChangeAspect="1"/>
-          </p:cNvPicPr>
-          <p:nvPr/>
-        </p:nvPicPr>
-        <p:blipFill>
-          <a:blip r:embed="rId5">
-            <a:extLst>
-              <a:ext uri="{28A0092B-C50C-407E-A947-70E740481C1C}">
-                <a14:useLocalDpi xmlns:a14="http://schemas.microsoft.com/office/drawing/2010/main" val="0"/>
-              </a:ext>
-            </a:extLst>
-          </a:blip>
-          <a:stretch>
-            <a:fillRect/>
-          </a:stretch>
-        </p:blipFill>
-        <p:spPr>
-          <a:xfrm>
-            <a:off x="6089652" y="3942170"/>
-            <a:ext cx="2316092" cy="2522621"/>
-          </a:xfrm>
-          <a:prstGeom prst="rect">
-            <a:avLst/>
-          </a:prstGeom>
-          <a:ln w="25400">
-            <a:solidFill>
-              <a:schemeClr val="accent1"/>
-            </a:solidFill>
-          </a:ln>
-          <a:effectLst>
-            <a:outerShdw blurRad="50800" dist="38100" dir="2700000" algn="tl" rotWithShape="0">
-              <a:prstClr val="black">
-                <a:alpha val="40000"/>
-              </a:prstClr>
-            </a:outerShdw>
-          </a:effectLst>
-        </p:spPr>
-      </p:pic>
-      <p:sp>
-        <p:nvSpPr>
-          <p:cNvPr id="6" name="TextBox 5">
-            <a:extLst>
-              <a:ext uri="{FF2B5EF4-FFF2-40B4-BE49-F238E27FC236}">
-                <a16:creationId xmlns:a16="http://schemas.microsoft.com/office/drawing/2014/main" id="{ABDAB5EB-F707-41C5-8DBE-C606D4EA4EFC}"/>
-              </a:ext>
-            </a:extLst>
-          </p:cNvPr>
-          <p:cNvSpPr txBox="1"/>
-          <p:nvPr/>
-        </p:nvSpPr>
-        <p:spPr>
-          <a:xfrm>
-            <a:off x="1099751" y="2223475"/>
-            <a:ext cx="3263751" cy="369332"/>
-          </a:xfrm>
-          <a:prstGeom prst="rect">
-            <a:avLst/>
-          </a:prstGeom>
-          <a:solidFill>
-            <a:schemeClr val="bg1"/>
-          </a:solidFill>
-        </p:spPr>
-        <p:txBody>
-          <a:bodyPr wrap="square" rtlCol="0">
-            <a:spAutoFit/>
-          </a:bodyPr>
-          <a:lstStyle/>
-          <a:p>
-            <a:pPr algn="ctr"/>
-            <a:r>
-              <a:rPr lang="en-US" b="1" dirty="0"/>
-              <a:t>Number of Trails per State</a:t>
-            </a:r>
-          </a:p>
-        </p:txBody>
-      </p:sp>
       <p:sp>
         <p:nvSpPr>
           <p:cNvPr id="7" name="TextBox 6">
@@ -4560,7 +4343,7 @@
           <a:p>
             <a:r>
               <a:rPr lang="en-US" dirty="0"/>
-              <a:t>The average ratings are very tightly distributed.  Difficult to distinguish excellent vs good trails.</a:t>
+              <a:t>The average ratings are tightly distributed.  Difficult to distinguish excellent vs good trails.</a:t>
             </a:r>
           </a:p>
         </p:txBody>
@@ -4612,7 +4395,7 @@
           <a:p>
             <a:r>
               <a:rPr lang="en-US" dirty="0"/>
-              <a:t>Trail popularity, based on the number of reviews,  shows variation.  </a:t>
+              <a:t>Trail popularity, based on the number of reviews, has wide variation.</a:t>
             </a:r>
           </a:p>
           <a:p>
@@ -4621,7 +4404,7 @@
           <a:p>
             <a:r>
               <a:rPr lang="en-US" dirty="0"/>
-              <a:t>What’s driving a trail’s popularity?</a:t>
+              <a:t>What drives a trail’s popularity?</a:t>
             </a:r>
           </a:p>
           <a:p>
@@ -4629,6 +4412,129 @@
           </a:p>
         </p:txBody>
       </p:sp>
+      <p:pic>
+        <p:nvPicPr>
+          <p:cNvPr id="10" name="Picture 9" descr="Chart, histogram&#10;&#10;Description automatically generated">
+            <a:extLst>
+              <a:ext uri="{FF2B5EF4-FFF2-40B4-BE49-F238E27FC236}">
+                <a16:creationId xmlns:a16="http://schemas.microsoft.com/office/drawing/2014/main" id="{5AA7231D-2B3B-492B-BB9B-A8E7F4222EE8}"/>
+              </a:ext>
+            </a:extLst>
+          </p:cNvPr>
+          <p:cNvPicPr>
+            <a:picLocks noChangeAspect="1"/>
+          </p:cNvPicPr>
+          <p:nvPr/>
+        </p:nvPicPr>
+        <p:blipFill>
+          <a:blip r:embed="rId2">
+            <a:extLst>
+              <a:ext uri="{28A0092B-C50C-407E-A947-70E740481C1C}">
+                <a14:useLocalDpi xmlns:a14="http://schemas.microsoft.com/office/drawing/2010/main" val="0"/>
+              </a:ext>
+            </a:extLst>
+          </a:blip>
+          <a:stretch>
+            <a:fillRect/>
+          </a:stretch>
+        </p:blipFill>
+        <p:spPr>
+          <a:xfrm>
+            <a:off x="338748" y="989257"/>
+            <a:ext cx="5084218" cy="4370006"/>
+          </a:xfrm>
+          <a:prstGeom prst="rect">
+            <a:avLst/>
+          </a:prstGeom>
+          <a:ln w="25400">
+            <a:solidFill>
+              <a:schemeClr val="accent1"/>
+            </a:solidFill>
+          </a:ln>
+        </p:spPr>
+      </p:pic>
+      <p:pic>
+        <p:nvPicPr>
+          <p:cNvPr id="12" name="Picture 11" descr="Text, table&#10;&#10;Description automatically generated">
+            <a:extLst>
+              <a:ext uri="{FF2B5EF4-FFF2-40B4-BE49-F238E27FC236}">
+                <a16:creationId xmlns:a16="http://schemas.microsoft.com/office/drawing/2014/main" id="{469E0466-6C24-4E2E-9901-8BF9B611153B}"/>
+              </a:ext>
+            </a:extLst>
+          </p:cNvPr>
+          <p:cNvPicPr>
+            <a:picLocks noChangeAspect="1"/>
+          </p:cNvPicPr>
+          <p:nvPr/>
+        </p:nvPicPr>
+        <p:blipFill>
+          <a:blip r:embed="rId3">
+            <a:extLst>
+              <a:ext uri="{28A0092B-C50C-407E-A947-70E740481C1C}">
+                <a14:useLocalDpi xmlns:a14="http://schemas.microsoft.com/office/drawing/2010/main" val="0"/>
+              </a:ext>
+            </a:extLst>
+          </a:blip>
+          <a:stretch>
+            <a:fillRect/>
+          </a:stretch>
+        </p:blipFill>
+        <p:spPr>
+          <a:xfrm>
+            <a:off x="6237709" y="763372"/>
+            <a:ext cx="2023606" cy="2498108"/>
+          </a:xfrm>
+          <a:prstGeom prst="rect">
+            <a:avLst/>
+          </a:prstGeom>
+          <a:ln w="25400">
+            <a:solidFill>
+              <a:schemeClr val="accent1"/>
+            </a:solidFill>
+          </a:ln>
+        </p:spPr>
+      </p:pic>
+      <p:pic>
+        <p:nvPicPr>
+          <p:cNvPr id="14" name="Picture 13" descr="Text, table&#10;&#10;Description automatically generated">
+            <a:extLst>
+              <a:ext uri="{FF2B5EF4-FFF2-40B4-BE49-F238E27FC236}">
+                <a16:creationId xmlns:a16="http://schemas.microsoft.com/office/drawing/2014/main" id="{BA505DFB-D9D9-4157-9135-21BE4080FE8A}"/>
+              </a:ext>
+            </a:extLst>
+          </p:cNvPr>
+          <p:cNvPicPr>
+            <a:picLocks noChangeAspect="1"/>
+          </p:cNvPicPr>
+          <p:nvPr/>
+        </p:nvPicPr>
+        <p:blipFill>
+          <a:blip r:embed="rId4">
+            <a:extLst>
+              <a:ext uri="{28A0092B-C50C-407E-A947-70E740481C1C}">
+                <a14:useLocalDpi xmlns:a14="http://schemas.microsoft.com/office/drawing/2010/main" val="0"/>
+              </a:ext>
+            </a:extLst>
+          </a:blip>
+          <a:stretch>
+            <a:fillRect/>
+          </a:stretch>
+        </p:blipFill>
+        <p:spPr>
+          <a:xfrm>
+            <a:off x="6191158" y="4023570"/>
+            <a:ext cx="2116708" cy="2411085"/>
+          </a:xfrm>
+          <a:prstGeom prst="rect">
+            <a:avLst/>
+          </a:prstGeom>
+          <a:ln w="25400">
+            <a:solidFill>
+              <a:schemeClr val="accent1"/>
+            </a:solidFill>
+          </a:ln>
+        </p:spPr>
+      </p:pic>
     </p:spTree>
     <p:extLst>
       <p:ext uri="{BB962C8B-B14F-4D97-AF65-F5344CB8AC3E}">
@@ -4663,7 +4569,7 @@
                             </p:stCondLst>
                             <p:childTnLst>
                               <p:par>
-                                <p:cTn id="5" presetID="1" presetClass="entr" presetSubtype="0" fill="hold" nodeType="withEffect">
+                                <p:cTn id="5" presetID="1" presetClass="entr" presetSubtype="0" fill="hold" grpId="0" nodeType="withEffect">
                                   <p:stCondLst>
                                     <p:cond delay="0"/>
                                   </p:stCondLst>
@@ -4676,61 +4582,7 @@
                                           </p:stCondLst>
                                         </p:cTn>
                                         <p:tgtEl>
-                                          <p:spTgt spid="4"/>
-                                        </p:tgtEl>
-                                        <p:attrNameLst>
-                                          <p:attrName>style.visibility</p:attrName>
-                                        </p:attrNameLst>
-                                      </p:cBhvr>
-                                      <p:to>
-                                        <p:strVal val="visible"/>
-                                      </p:to>
-                                    </p:set>
-                                  </p:childTnLst>
-                                </p:cTn>
-                              </p:par>
-                              <p:par>
-                                <p:cTn id="7" presetID="1" presetClass="entr" presetSubtype="0" fill="hold" grpId="0" nodeType="withEffect">
-                                  <p:stCondLst>
-                                    <p:cond delay="0"/>
-                                  </p:stCondLst>
-                                  <p:childTnLst>
-                                    <p:set>
-                                      <p:cBhvr>
-                                        <p:cTn id="8" dur="1" fill="hold">
-                                          <p:stCondLst>
-                                            <p:cond delay="0"/>
-                                          </p:stCondLst>
-                                        </p:cTn>
-                                        <p:tgtEl>
                                           <p:spTgt spid="7"/>
-                                        </p:tgtEl>
-                                        <p:attrNameLst>
-                                          <p:attrName>style.visibility</p:attrName>
-                                        </p:attrNameLst>
-                                      </p:cBhvr>
-                                      <p:to>
-                                        <p:strVal val="visible"/>
-                                      </p:to>
-                                    </p:set>
-                                  </p:childTnLst>
-                                </p:cTn>
-                              </p:par>
-                              <p:par>
-                                <p:cTn id="9" presetID="1" presetClass="entr" presetSubtype="0" fill="hold" nodeType="withEffect">
-                                  <p:stCondLst>
-                                    <p:cond delay="0"/>
-                                  </p:stCondLst>
-                                  <p:childTnLst>
-                                    <p:set>
-                                      <p:cBhvr>
-                                        <p:cTn id="10" dur="1" fill="hold">
-                                          <p:stCondLst>
-                                            <p:cond delay="0"/>
-                                          </p:stCondLst>
-                                        </p:cTn>
-                                        <p:tgtEl>
-                                          <p:spTgt spid="5"/>
                                         </p:tgtEl>
                                         <p:attrNameLst>
                                           <p:attrName>style.visibility</p:attrName>
@@ -4802,6 +4654,430 @@
           <a:chExt cx="0" cy="0"/>
         </a:xfrm>
       </p:grpSpPr>
+      <p:sp>
+        <p:nvSpPr>
+          <p:cNvPr id="22" name="Rectangle 21">
+            <a:extLst>
+              <a:ext uri="{FF2B5EF4-FFF2-40B4-BE49-F238E27FC236}">
+                <a16:creationId xmlns:a16="http://schemas.microsoft.com/office/drawing/2014/main" id="{CEC27341-4ABB-43EF-9E57-10A858F9251F}"/>
+              </a:ext>
+              <a:ext uri="{C183D7F6-B498-43B3-948B-1728B52AA6E4}">
+                <adec:decorative xmlns:adec="http://schemas.microsoft.com/office/drawing/2017/decorative" val="1"/>
+              </a:ext>
+            </a:extLst>
+          </p:cNvPr>
+          <p:cNvSpPr>
+            <a:spLocks noGrp="1" noRot="1" noChangeAspect="1" noMove="1" noResize="1" noEditPoints="1" noAdjustHandles="1" noChangeArrowheads="1" noChangeShapeType="1" noTextEdit="1"/>
+          </p:cNvSpPr>
+          <p:nvPr>
+            <p:extLst>
+              <p:ext uri="{386F3935-93C4-4BCD-93E2-E3B085C9AB24}">
+                <p16:designElem xmlns:p16="http://schemas.microsoft.com/office/powerpoint/2015/main" val="1"/>
+              </p:ext>
+            </p:extLst>
+          </p:nvPr>
+        </p:nvSpPr>
+        <p:spPr>
+          <a:xfrm>
+            <a:off x="1" y="0"/>
+            <a:ext cx="12188726" cy="6858000"/>
+          </a:xfrm>
+          <a:prstGeom prst="rect">
+            <a:avLst/>
+          </a:prstGeom>
+          <a:solidFill>
+            <a:srgbClr val="3B6268"/>
+          </a:solidFill>
+          <a:ln>
+            <a:noFill/>
+          </a:ln>
+        </p:spPr>
+        <p:style>
+          <a:lnRef idx="2">
+            <a:schemeClr val="accent1">
+              <a:shade val="50000"/>
+            </a:schemeClr>
+          </a:lnRef>
+          <a:fillRef idx="1">
+            <a:schemeClr val="accent1"/>
+          </a:fillRef>
+          <a:effectRef idx="0">
+            <a:schemeClr val="accent1"/>
+          </a:effectRef>
+          <a:fontRef idx="minor">
+            <a:schemeClr val="lt1"/>
+          </a:fontRef>
+        </p:style>
+        <p:txBody>
+          <a:bodyPr rtlCol="0" anchor="ctr"/>
+          <a:lstStyle/>
+          <a:p>
+            <a:pPr algn="ctr"/>
+            <a:endParaRPr lang="en-US"/>
+          </a:p>
+        </p:txBody>
+      </p:sp>
+      <p:sp>
+        <p:nvSpPr>
+          <p:cNvPr id="24" name="Rectangle 23">
+            <a:extLst>
+              <a:ext uri="{FF2B5EF4-FFF2-40B4-BE49-F238E27FC236}">
+                <a16:creationId xmlns:a16="http://schemas.microsoft.com/office/drawing/2014/main" id="{D2B98C55-54CC-433B-905F-FB0B2D2009ED}"/>
+              </a:ext>
+              <a:ext uri="{C183D7F6-B498-43B3-948B-1728B52AA6E4}">
+                <adec:decorative xmlns:adec="http://schemas.microsoft.com/office/drawing/2017/decorative" val="1"/>
+              </a:ext>
+            </a:extLst>
+          </p:cNvPr>
+          <p:cNvSpPr>
+            <a:spLocks noGrp="1" noRot="1" noChangeAspect="1" noMove="1" noResize="1" noEditPoints="1" noAdjustHandles="1" noChangeArrowheads="1" noChangeShapeType="1" noTextEdit="1"/>
+          </p:cNvSpPr>
+          <p:nvPr>
+            <p:extLst>
+              <p:ext uri="{386F3935-93C4-4BCD-93E2-E3B085C9AB24}">
+                <p16:designElem xmlns:p16="http://schemas.microsoft.com/office/powerpoint/2015/main" val="1"/>
+              </p:ext>
+            </p:extLst>
+          </p:nvPr>
+        </p:nvSpPr>
+        <p:spPr>
+          <a:xfrm>
+            <a:off x="495953" y="484068"/>
+            <a:ext cx="3414014" cy="5889300"/>
+          </a:xfrm>
+          <a:prstGeom prst="rect">
+            <a:avLst/>
+          </a:prstGeom>
+          <a:solidFill>
+            <a:srgbClr val="FFFFFF"/>
+          </a:solidFill>
+          <a:ln>
+            <a:noFill/>
+          </a:ln>
+        </p:spPr>
+        <p:style>
+          <a:lnRef idx="2">
+            <a:schemeClr val="accent1">
+              <a:shade val="50000"/>
+            </a:schemeClr>
+          </a:lnRef>
+          <a:fillRef idx="1">
+            <a:schemeClr val="accent1"/>
+          </a:fillRef>
+          <a:effectRef idx="0">
+            <a:schemeClr val="accent1"/>
+          </a:effectRef>
+          <a:fontRef idx="minor">
+            <a:schemeClr val="lt1"/>
+          </a:fontRef>
+        </p:style>
+        <p:txBody>
+          <a:bodyPr rtlCol="0" anchor="ctr"/>
+          <a:lstStyle/>
+          <a:p>
+            <a:pPr algn="ctr"/>
+            <a:endParaRPr lang="en-US"/>
+          </a:p>
+        </p:txBody>
+      </p:sp>
+      <p:pic>
+        <p:nvPicPr>
+          <p:cNvPr id="8" name="Picture 7" descr="A picture containing clipart&#10;&#10;Description automatically generated">
+            <a:hlinkClick r:id="rId2" action="ppaction://hlinksldjump"/>
+            <a:extLst>
+              <a:ext uri="{FF2B5EF4-FFF2-40B4-BE49-F238E27FC236}">
+                <a16:creationId xmlns:a16="http://schemas.microsoft.com/office/drawing/2014/main" id="{39D630E5-7048-4542-A2E7-AE5BC176AD7C}"/>
+              </a:ext>
+            </a:extLst>
+          </p:cNvPr>
+          <p:cNvPicPr>
+            <a:picLocks noChangeAspect="1"/>
+          </p:cNvPicPr>
+          <p:nvPr/>
+        </p:nvPicPr>
+        <p:blipFill>
+          <a:blip r:embed="rId3">
+            <a:extLst>
+              <a:ext uri="{28A0092B-C50C-407E-A947-70E740481C1C}">
+                <a14:useLocalDpi xmlns:a14="http://schemas.microsoft.com/office/drawing/2010/main" val="0"/>
+              </a:ext>
+            </a:extLst>
+          </a:blip>
+          <a:stretch>
+            <a:fillRect/>
+          </a:stretch>
+        </p:blipFill>
+        <p:spPr>
+          <a:xfrm>
+            <a:off x="814559" y="1506633"/>
+            <a:ext cx="2781372" cy="3844171"/>
+          </a:xfrm>
+          <a:prstGeom prst="rect">
+            <a:avLst/>
+          </a:prstGeom>
+        </p:spPr>
+      </p:pic>
+      <p:sp>
+        <p:nvSpPr>
+          <p:cNvPr id="26" name="Rectangle 25">
+            <a:extLst>
+              <a:ext uri="{FF2B5EF4-FFF2-40B4-BE49-F238E27FC236}">
+                <a16:creationId xmlns:a16="http://schemas.microsoft.com/office/drawing/2014/main" id="{19E21906-D4D4-4F16-9228-3E004930E1C7}"/>
+              </a:ext>
+              <a:ext uri="{C183D7F6-B498-43B3-948B-1728B52AA6E4}">
+                <adec:decorative xmlns:adec="http://schemas.microsoft.com/office/drawing/2017/decorative" val="1"/>
+              </a:ext>
+            </a:extLst>
+          </p:cNvPr>
+          <p:cNvSpPr>
+            <a:spLocks noGrp="1" noRot="1" noChangeAspect="1" noMove="1" noResize="1" noEditPoints="1" noAdjustHandles="1" noChangeArrowheads="1" noChangeShapeType="1" noTextEdit="1"/>
+          </p:cNvSpPr>
+          <p:nvPr>
+            <p:extLst>
+              <p:ext uri="{386F3935-93C4-4BCD-93E2-E3B085C9AB24}">
+                <p16:designElem xmlns:p16="http://schemas.microsoft.com/office/powerpoint/2015/main" val="1"/>
+              </p:ext>
+            </p:extLst>
+          </p:nvPr>
+        </p:nvSpPr>
+        <p:spPr>
+          <a:xfrm>
+            <a:off x="4071968" y="485853"/>
+            <a:ext cx="3575304" cy="5889300"/>
+          </a:xfrm>
+          <a:prstGeom prst="rect">
+            <a:avLst/>
+          </a:prstGeom>
+          <a:solidFill>
+            <a:srgbClr val="FFFFFF"/>
+          </a:solidFill>
+          <a:ln>
+            <a:noFill/>
+          </a:ln>
+        </p:spPr>
+        <p:style>
+          <a:lnRef idx="2">
+            <a:schemeClr val="accent1">
+              <a:shade val="50000"/>
+            </a:schemeClr>
+          </a:lnRef>
+          <a:fillRef idx="1">
+            <a:schemeClr val="accent1"/>
+          </a:fillRef>
+          <a:effectRef idx="0">
+            <a:schemeClr val="accent1"/>
+          </a:effectRef>
+          <a:fontRef idx="minor">
+            <a:schemeClr val="lt1"/>
+          </a:fontRef>
+        </p:style>
+        <p:txBody>
+          <a:bodyPr rtlCol="0" anchor="ctr"/>
+          <a:lstStyle/>
+          <a:p>
+            <a:pPr algn="ctr"/>
+            <a:endParaRPr lang="en-US"/>
+          </a:p>
+        </p:txBody>
+      </p:sp>
+      <p:pic>
+        <p:nvPicPr>
+          <p:cNvPr id="3" name="Picture 2" descr="Text&#10;&#10;Description automatically generated">
+            <a:extLst>
+              <a:ext uri="{FF2B5EF4-FFF2-40B4-BE49-F238E27FC236}">
+                <a16:creationId xmlns:a16="http://schemas.microsoft.com/office/drawing/2014/main" id="{94056B32-5E2B-4E88-A906-63E6A0CAC086}"/>
+              </a:ext>
+            </a:extLst>
+          </p:cNvPr>
+          <p:cNvPicPr>
+            <a:picLocks noChangeAspect="1"/>
+          </p:cNvPicPr>
+          <p:nvPr/>
+        </p:nvPicPr>
+        <p:blipFill>
+          <a:blip r:embed="rId4">
+            <a:extLst>
+              <a:ext uri="{28A0092B-C50C-407E-A947-70E740481C1C}">
+                <a14:useLocalDpi xmlns:a14="http://schemas.microsoft.com/office/drawing/2010/main" val="0"/>
+              </a:ext>
+            </a:extLst>
+          </a:blip>
+          <a:stretch>
+            <a:fillRect/>
+          </a:stretch>
+        </p:blipFill>
+        <p:spPr>
+          <a:xfrm>
+            <a:off x="4392567" y="1513494"/>
+            <a:ext cx="2941124" cy="3830448"/>
+          </a:xfrm>
+          <a:prstGeom prst="rect">
+            <a:avLst/>
+          </a:prstGeom>
+        </p:spPr>
+      </p:pic>
+      <p:sp>
+        <p:nvSpPr>
+          <p:cNvPr id="28" name="Rectangle 27">
+            <a:extLst>
+              <a:ext uri="{FF2B5EF4-FFF2-40B4-BE49-F238E27FC236}">
+                <a16:creationId xmlns:a16="http://schemas.microsoft.com/office/drawing/2014/main" id="{865BCC85-4C69-4CFB-A36A-6A489B87FFF3}"/>
+              </a:ext>
+              <a:ext uri="{C183D7F6-B498-43B3-948B-1728B52AA6E4}">
+                <adec:decorative xmlns:adec="http://schemas.microsoft.com/office/drawing/2017/decorative" val="1"/>
+              </a:ext>
+            </a:extLst>
+          </p:cNvPr>
+          <p:cNvSpPr>
+            <a:spLocks noGrp="1" noRot="1" noChangeAspect="1" noMove="1" noResize="1" noEditPoints="1" noAdjustHandles="1" noChangeArrowheads="1" noChangeShapeType="1" noTextEdit="1"/>
+          </p:cNvSpPr>
+          <p:nvPr>
+            <p:extLst>
+              <p:ext uri="{386F3935-93C4-4BCD-93E2-E3B085C9AB24}">
+                <p16:designElem xmlns:p16="http://schemas.microsoft.com/office/powerpoint/2015/main" val="1"/>
+              </p:ext>
+            </p:extLst>
+          </p:nvPr>
+        </p:nvSpPr>
+        <p:spPr>
+          <a:xfrm>
+            <a:off x="7808139" y="484069"/>
+            <a:ext cx="3899229" cy="2864215"/>
+          </a:xfrm>
+          <a:prstGeom prst="rect">
+            <a:avLst/>
+          </a:prstGeom>
+          <a:solidFill>
+            <a:srgbClr val="FFFFFF"/>
+          </a:solidFill>
+          <a:ln>
+            <a:noFill/>
+          </a:ln>
+        </p:spPr>
+        <p:style>
+          <a:lnRef idx="2">
+            <a:schemeClr val="accent1">
+              <a:shade val="50000"/>
+            </a:schemeClr>
+          </a:lnRef>
+          <a:fillRef idx="1">
+            <a:schemeClr val="accent1"/>
+          </a:fillRef>
+          <a:effectRef idx="0">
+            <a:schemeClr val="accent1"/>
+          </a:effectRef>
+          <a:fontRef idx="minor">
+            <a:schemeClr val="lt1"/>
+          </a:fontRef>
+        </p:style>
+        <p:txBody>
+          <a:bodyPr rtlCol="0" anchor="ctr"/>
+          <a:lstStyle/>
+          <a:p>
+            <a:pPr algn="ctr"/>
+            <a:endParaRPr lang="en-US"/>
+          </a:p>
+        </p:txBody>
+      </p:sp>
+      <p:pic>
+        <p:nvPicPr>
+          <p:cNvPr id="7" name="Picture 6" descr="Table&#10;&#10;Description automatically generated">
+            <a:extLst>
+              <a:ext uri="{FF2B5EF4-FFF2-40B4-BE49-F238E27FC236}">
+                <a16:creationId xmlns:a16="http://schemas.microsoft.com/office/drawing/2014/main" id="{08026EF8-6A2D-4506-8516-F4AACFF26C11}"/>
+              </a:ext>
+            </a:extLst>
+          </p:cNvPr>
+          <p:cNvPicPr>
+            <a:picLocks noChangeAspect="1"/>
+          </p:cNvPicPr>
+          <p:nvPr/>
+        </p:nvPicPr>
+        <p:blipFill>
+          <a:blip r:embed="rId5">
+            <a:extLst>
+              <a:ext uri="{28A0092B-C50C-407E-A947-70E740481C1C}">
+                <a14:useLocalDpi xmlns:a14="http://schemas.microsoft.com/office/drawing/2010/main" val="0"/>
+              </a:ext>
+            </a:extLst>
+          </a:blip>
+          <a:stretch>
+            <a:fillRect/>
+          </a:stretch>
+        </p:blipFill>
+        <p:spPr>
+          <a:xfrm>
+            <a:off x="8338552" y="798656"/>
+            <a:ext cx="2838471" cy="2230228"/>
+          </a:xfrm>
+          <a:prstGeom prst="rect">
+            <a:avLst/>
+          </a:prstGeom>
+        </p:spPr>
+      </p:pic>
+      <p:sp>
+        <p:nvSpPr>
+          <p:cNvPr id="30" name="Rectangle 29">
+            <a:extLst>
+              <a:ext uri="{FF2B5EF4-FFF2-40B4-BE49-F238E27FC236}">
+                <a16:creationId xmlns:a16="http://schemas.microsoft.com/office/drawing/2014/main" id="{3A14BDAC-394B-4E9A-8ECE-61AA1A7C231A}"/>
+              </a:ext>
+              <a:ext uri="{C183D7F6-B498-43B3-948B-1728B52AA6E4}">
+                <adec:decorative xmlns:adec="http://schemas.microsoft.com/office/drawing/2017/decorative" val="1"/>
+              </a:ext>
+            </a:extLst>
+          </p:cNvPr>
+          <p:cNvSpPr>
+            <a:spLocks noGrp="1" noRot="1" noChangeAspect="1" noMove="1" noResize="1" noEditPoints="1" noAdjustHandles="1" noChangeArrowheads="1" noChangeShapeType="1" noTextEdit="1"/>
+          </p:cNvSpPr>
+          <p:nvPr>
+            <p:extLst>
+              <p:ext uri="{386F3935-93C4-4BCD-93E2-E3B085C9AB24}">
+                <p16:designElem xmlns:p16="http://schemas.microsoft.com/office/powerpoint/2015/main" val="1"/>
+              </p:ext>
+            </p:extLst>
+          </p:nvPr>
+        </p:nvSpPr>
+        <p:spPr>
+          <a:xfrm>
+            <a:off x="7808139" y="3509152"/>
+            <a:ext cx="3899229" cy="2847200"/>
+          </a:xfrm>
+          <a:prstGeom prst="rect">
+            <a:avLst/>
+          </a:prstGeom>
+          <a:solidFill>
+            <a:srgbClr val="FFFFFF"/>
+          </a:solidFill>
+          <a:ln>
+            <a:noFill/>
+          </a:ln>
+        </p:spPr>
+        <p:style>
+          <a:lnRef idx="2">
+            <a:schemeClr val="accent1">
+              <a:shade val="50000"/>
+            </a:schemeClr>
+          </a:lnRef>
+          <a:fillRef idx="1">
+            <a:schemeClr val="accent1"/>
+          </a:fillRef>
+          <a:effectRef idx="0">
+            <a:schemeClr val="accent1"/>
+          </a:effectRef>
+          <a:fontRef idx="minor">
+            <a:schemeClr val="lt1"/>
+          </a:fontRef>
+        </p:style>
+        <p:txBody>
+          <a:bodyPr rtlCol="0" anchor="ctr"/>
+          <a:lstStyle/>
+          <a:p>
+            <a:pPr algn="ctr"/>
+            <a:endParaRPr lang="en-US"/>
+          </a:p>
+        </p:txBody>
+      </p:sp>
       <p:pic>
         <p:nvPicPr>
           <p:cNvPr id="11" name="Picture 2" descr="Curvy road landscape background illustration">
@@ -4817,8 +5093,7 @@
           <p:nvPr/>
         </p:nvPicPr>
         <p:blipFill rotWithShape="1">
-          <a:blip r:embed="rId2">
-            <a:alphaModFix amt="60000"/>
+          <a:blip r:embed="rId6">
             <a:extLst>
               <a:ext uri="{28A0092B-C50C-407E-A947-70E740481C1C}">
                 <a14:useLocalDpi xmlns:a14="http://schemas.microsoft.com/office/drawing/2010/main" val="0"/>
@@ -4830,8 +5105,8 @@
         </p:blipFill>
         <p:spPr bwMode="auto">
           <a:xfrm>
-            <a:off x="-6338" y="1282"/>
-            <a:ext cx="12191980" cy="6856718"/>
+            <a:off x="8129873" y="4027373"/>
+            <a:ext cx="3255829" cy="1831066"/>
           </a:xfrm>
           <a:prstGeom prst="rect">
             <a:avLst/>
@@ -4846,218 +5121,6 @@
               </a14:hiddenFill>
             </a:ext>
           </a:extLst>
-        </p:spPr>
-      </p:pic>
-      <p:pic>
-        <p:nvPicPr>
-          <p:cNvPr id="8" name="Picture 7" descr="A picture containing clipart&#10;&#10;Description automatically generated">
-            <a:hlinkClick r:id="rId3" action="ppaction://hlinksldjump"/>
-            <a:extLst>
-              <a:ext uri="{FF2B5EF4-FFF2-40B4-BE49-F238E27FC236}">
-                <a16:creationId xmlns:a16="http://schemas.microsoft.com/office/drawing/2014/main" id="{39D630E5-7048-4542-A2E7-AE5BC176AD7C}"/>
-              </a:ext>
-            </a:extLst>
-          </p:cNvPr>
-          <p:cNvPicPr>
-            <a:picLocks noChangeAspect="1"/>
-          </p:cNvPicPr>
-          <p:nvPr/>
-        </p:nvPicPr>
-        <p:blipFill>
-          <a:blip r:embed="rId4">
-            <a:extLst>
-              <a:ext uri="{28A0092B-C50C-407E-A947-70E740481C1C}">
-                <a14:useLocalDpi xmlns:a14="http://schemas.microsoft.com/office/drawing/2010/main" val="0"/>
-              </a:ext>
-            </a:extLst>
-          </a:blip>
-          <a:stretch>
-            <a:fillRect/>
-          </a:stretch>
-        </p:blipFill>
-        <p:spPr>
-          <a:xfrm>
-            <a:off x="4414906" y="1126600"/>
-            <a:ext cx="3331709" cy="4604800"/>
-          </a:xfrm>
-          <a:prstGeom prst="rect">
-            <a:avLst/>
-          </a:prstGeom>
-        </p:spPr>
-      </p:pic>
-      <p:cxnSp>
-        <p:nvCxnSpPr>
-          <p:cNvPr id="15" name="Straight Connector 14">
-            <a:extLst>
-              <a:ext uri="{FF2B5EF4-FFF2-40B4-BE49-F238E27FC236}">
-                <a16:creationId xmlns:a16="http://schemas.microsoft.com/office/drawing/2014/main" id="{DCD67800-37AC-4E14-89B0-F79DCB3FB86D}"/>
-              </a:ext>
-              <a:ext uri="{C183D7F6-B498-43B3-948B-1728B52AA6E4}">
-                <adec:decorative xmlns:adec="http://schemas.microsoft.com/office/drawing/2017/decorative" val="1"/>
-              </a:ext>
-            </a:extLst>
-          </p:cNvPr>
-          <p:cNvCxnSpPr>
-            <a:cxnSpLocks noGrp="1" noRot="1" noChangeAspect="1" noMove="1" noResize="1" noEditPoints="1" noAdjustHandles="1" noChangeArrowheads="1" noChangeShapeType="1"/>
-          </p:cNvCxnSpPr>
-          <p:nvPr>
-            <p:extLst>
-              <p:ext uri="{386F3935-93C4-4BCD-93E2-E3B085C9AB24}">
-                <p16:designElem xmlns:p16="http://schemas.microsoft.com/office/powerpoint/2015/main" val="1"/>
-              </p:ext>
-            </p:extLst>
-          </p:nvPr>
-        </p:nvCxnSpPr>
-        <p:spPr>
-          <a:xfrm>
-            <a:off x="4165600" y="1573887"/>
-            <a:ext cx="0" cy="3710227"/>
-          </a:xfrm>
-          <a:prstGeom prst="line">
-            <a:avLst/>
-          </a:prstGeom>
-          <a:ln w="19050">
-            <a:solidFill>
-              <a:srgbClr val="7F7F7F"/>
-            </a:solidFill>
-          </a:ln>
-        </p:spPr>
-        <p:style>
-          <a:lnRef idx="1">
-            <a:schemeClr val="accent1"/>
-          </a:lnRef>
-          <a:fillRef idx="0">
-            <a:schemeClr val="accent1"/>
-          </a:fillRef>
-          <a:effectRef idx="0">
-            <a:schemeClr val="accent1"/>
-          </a:effectRef>
-          <a:fontRef idx="minor">
-            <a:schemeClr val="tx1"/>
-          </a:fontRef>
-        </p:style>
-      </p:cxnSp>
-      <p:cxnSp>
-        <p:nvCxnSpPr>
-          <p:cNvPr id="17" name="Straight Connector 16">
-            <a:extLst>
-              <a:ext uri="{FF2B5EF4-FFF2-40B4-BE49-F238E27FC236}">
-                <a16:creationId xmlns:a16="http://schemas.microsoft.com/office/drawing/2014/main" id="{20F1788F-A5AE-4188-8274-F7F2E3833ECD}"/>
-              </a:ext>
-              <a:ext uri="{C183D7F6-B498-43B3-948B-1728B52AA6E4}">
-                <adec:decorative xmlns:adec="http://schemas.microsoft.com/office/drawing/2017/decorative" val="1"/>
-              </a:ext>
-            </a:extLst>
-          </p:cNvPr>
-          <p:cNvCxnSpPr>
-            <a:cxnSpLocks noGrp="1" noRot="1" noChangeAspect="1" noMove="1" noResize="1" noEditPoints="1" noAdjustHandles="1" noChangeArrowheads="1" noChangeShapeType="1"/>
-          </p:cNvCxnSpPr>
-          <p:nvPr>
-            <p:extLst>
-              <p:ext uri="{386F3935-93C4-4BCD-93E2-E3B085C9AB24}">
-                <p16:designElem xmlns:p16="http://schemas.microsoft.com/office/powerpoint/2015/main" val="1"/>
-              </p:ext>
-            </p:extLst>
-          </p:nvPr>
-        </p:nvCxnSpPr>
-        <p:spPr>
-          <a:xfrm>
-            <a:off x="7995920" y="1573887"/>
-            <a:ext cx="0" cy="3710227"/>
-          </a:xfrm>
-          <a:prstGeom prst="line">
-            <a:avLst/>
-          </a:prstGeom>
-          <a:ln w="19050">
-            <a:solidFill>
-              <a:srgbClr val="7F7F7F"/>
-            </a:solidFill>
-          </a:ln>
-        </p:spPr>
-        <p:style>
-          <a:lnRef idx="1">
-            <a:schemeClr val="accent1"/>
-          </a:lnRef>
-          <a:fillRef idx="0">
-            <a:schemeClr val="accent1"/>
-          </a:fillRef>
-          <a:effectRef idx="0">
-            <a:schemeClr val="accent1"/>
-          </a:effectRef>
-          <a:fontRef idx="minor">
-            <a:schemeClr val="tx1"/>
-          </a:fontRef>
-        </p:style>
-      </p:cxnSp>
-      <p:pic>
-        <p:nvPicPr>
-          <p:cNvPr id="5" name="Picture 4" descr="Text&#10;&#10;Description automatically generated">
-            <a:extLst>
-              <a:ext uri="{FF2B5EF4-FFF2-40B4-BE49-F238E27FC236}">
-                <a16:creationId xmlns:a16="http://schemas.microsoft.com/office/drawing/2014/main" id="{F8EAA841-3250-49B4-A84E-8FE69CF49BBF}"/>
-              </a:ext>
-            </a:extLst>
-          </p:cNvPr>
-          <p:cNvPicPr>
-            <a:picLocks noChangeAspect="1"/>
-          </p:cNvPicPr>
-          <p:nvPr/>
-        </p:nvPicPr>
-        <p:blipFill rotWithShape="1">
-          <a:blip r:embed="rId5">
-            <a:extLst>
-              <a:ext uri="{28A0092B-C50C-407E-A947-70E740481C1C}">
-                <a14:useLocalDpi xmlns:a14="http://schemas.microsoft.com/office/drawing/2010/main" val="0"/>
-              </a:ext>
-            </a:extLst>
-          </a:blip>
-          <a:srcRect t="734" r="2" b="2"/>
-          <a:stretch/>
-        </p:blipFill>
-        <p:spPr>
-          <a:xfrm>
-            <a:off x="8272298" y="1303513"/>
-            <a:ext cx="3738719" cy="4250974"/>
-          </a:xfrm>
-          <a:prstGeom prst="rect">
-            <a:avLst/>
-          </a:prstGeom>
-        </p:spPr>
-      </p:pic>
-      <p:pic>
-        <p:nvPicPr>
-          <p:cNvPr id="4" name="Picture 3" descr="Table&#10;&#10;Description automatically generated">
-            <a:extLst>
-              <a:ext uri="{FF2B5EF4-FFF2-40B4-BE49-F238E27FC236}">
-                <a16:creationId xmlns:a16="http://schemas.microsoft.com/office/drawing/2014/main" id="{2B4E5407-871B-4104-AB9E-BE945B82A98F}"/>
-              </a:ext>
-            </a:extLst>
-          </p:cNvPr>
-          <p:cNvPicPr>
-            <a:picLocks noChangeAspect="1"/>
-          </p:cNvPicPr>
-          <p:nvPr/>
-        </p:nvPicPr>
-        <p:blipFill>
-          <a:blip r:embed="rId6">
-            <a:extLst>
-              <a:ext uri="{28A0092B-C50C-407E-A947-70E740481C1C}">
-                <a14:useLocalDpi xmlns:a14="http://schemas.microsoft.com/office/drawing/2010/main" val="0"/>
-              </a:ext>
-            </a:extLst>
-          </a:blip>
-          <a:stretch>
-            <a:fillRect/>
-          </a:stretch>
-        </p:blipFill>
-        <p:spPr>
-          <a:xfrm>
-            <a:off x="106332" y="1939063"/>
-            <a:ext cx="3854851" cy="2979874"/>
-          </a:xfrm>
-          <a:prstGeom prst="rect">
-            <a:avLst/>
-          </a:prstGeom>
         </p:spPr>
       </p:pic>
     </p:spTree>

</xml_diff>